<commit_message>
[Presentacion] changes on functional test pages
</commit_message>
<xml_diff>
--- a/docs/Reuniones/Sprint 1 - Formal/Presentacion.pptx
+++ b/docs/Reuniones/Sprint 1 - Formal/Presentacion.pptx
@@ -16,21 +16,9 @@
     <p:sldId id="264" r:id="rId10"/>
     <p:sldId id="265" r:id="rId11"/>
     <p:sldId id="266" r:id="rId12"/>
-    <p:sldId id="267" r:id="rId13"/>
-    <p:sldId id="268" r:id="rId14"/>
-    <p:sldId id="269" r:id="rId15"/>
-    <p:sldId id="270" r:id="rId16"/>
-    <p:sldId id="271" r:id="rId17"/>
-    <p:sldId id="272" r:id="rId18"/>
-    <p:sldId id="273" r:id="rId19"/>
-    <p:sldId id="274" r:id="rId20"/>
-    <p:sldId id="275" r:id="rId21"/>
-    <p:sldId id="276" r:id="rId22"/>
-    <p:sldId id="277" r:id="rId23"/>
-    <p:sldId id="278" r:id="rId24"/>
-    <p:sldId id="279" r:id="rId25"/>
-    <p:sldId id="280" r:id="rId26"/>
-    <p:sldId id="281" r:id="rId27"/>
+    <p:sldId id="282" r:id="rId13"/>
+    <p:sldId id="280" r:id="rId14"/>
+    <p:sldId id="281" r:id="rId15"/>
   </p:sldIdLst>
   <p:sldSz cx="9144000" cy="6858000" type="screen4x3"/>
   <p:notesSz cx="6858000" cy="9144000"/>
@@ -305,6 +293,7 @@
           <a:p>
             <a:fld id="{37257250-85BF-4CE9-8829-60D0CC99FEAA}" type="datetimeFigureOut">
               <a:rPr lang="es-AR" smtClean="0"/>
+              <a:pPr/>
               <a:t>15/09/2013</a:t>
             </a:fld>
             <a:endParaRPr lang="es-AR"/>
@@ -347,6 +336,7 @@
           <a:p>
             <a:fld id="{5D54C5B7-6535-45F6-B87D-0A10CE9C57BD}" type="slidenum">
               <a:rPr lang="es-AR" smtClean="0"/>
+              <a:pPr/>
               <a:t>‹Nº›</a:t>
             </a:fld>
             <a:endParaRPr lang="es-AR"/>
@@ -470,6 +460,7 @@
           <a:p>
             <a:fld id="{37257250-85BF-4CE9-8829-60D0CC99FEAA}" type="datetimeFigureOut">
               <a:rPr lang="es-AR" smtClean="0"/>
+              <a:pPr/>
               <a:t>15/09/2013</a:t>
             </a:fld>
             <a:endParaRPr lang="es-AR"/>
@@ -512,6 +503,7 @@
           <a:p>
             <a:fld id="{5D54C5B7-6535-45F6-B87D-0A10CE9C57BD}" type="slidenum">
               <a:rPr lang="es-AR" smtClean="0"/>
+              <a:pPr/>
               <a:t>‹Nº›</a:t>
             </a:fld>
             <a:endParaRPr lang="es-AR"/>
@@ -645,6 +637,7 @@
           <a:p>
             <a:fld id="{37257250-85BF-4CE9-8829-60D0CC99FEAA}" type="datetimeFigureOut">
               <a:rPr lang="es-AR" smtClean="0"/>
+              <a:pPr/>
               <a:t>15/09/2013</a:t>
             </a:fld>
             <a:endParaRPr lang="es-AR"/>
@@ -687,6 +680,7 @@
           <a:p>
             <a:fld id="{5D54C5B7-6535-45F6-B87D-0A10CE9C57BD}" type="slidenum">
               <a:rPr lang="es-AR" smtClean="0"/>
+              <a:pPr/>
               <a:t>‹Nº›</a:t>
             </a:fld>
             <a:endParaRPr lang="es-AR"/>
@@ -810,6 +804,7 @@
           <a:p>
             <a:fld id="{37257250-85BF-4CE9-8829-60D0CC99FEAA}" type="datetimeFigureOut">
               <a:rPr lang="es-AR" smtClean="0"/>
+              <a:pPr/>
               <a:t>15/09/2013</a:t>
             </a:fld>
             <a:endParaRPr lang="es-AR"/>
@@ -852,6 +847,7 @@
           <a:p>
             <a:fld id="{5D54C5B7-6535-45F6-B87D-0A10CE9C57BD}" type="slidenum">
               <a:rPr lang="es-AR" smtClean="0"/>
+              <a:pPr/>
               <a:t>‹Nº›</a:t>
             </a:fld>
             <a:endParaRPr lang="es-AR"/>
@@ -1052,6 +1048,7 @@
           <a:p>
             <a:fld id="{37257250-85BF-4CE9-8829-60D0CC99FEAA}" type="datetimeFigureOut">
               <a:rPr lang="es-AR" smtClean="0"/>
+              <a:pPr/>
               <a:t>15/09/2013</a:t>
             </a:fld>
             <a:endParaRPr lang="es-AR"/>
@@ -1094,6 +1091,7 @@
           <a:p>
             <a:fld id="{5D54C5B7-6535-45F6-B87D-0A10CE9C57BD}" type="slidenum">
               <a:rPr lang="es-AR" smtClean="0"/>
+              <a:pPr/>
               <a:t>‹Nº›</a:t>
             </a:fld>
             <a:endParaRPr lang="es-AR"/>
@@ -1316,6 +1314,7 @@
           <a:p>
             <a:fld id="{37257250-85BF-4CE9-8829-60D0CC99FEAA}" type="datetimeFigureOut">
               <a:rPr lang="es-AR" smtClean="0"/>
+              <a:pPr/>
               <a:t>15/09/2013</a:t>
             </a:fld>
             <a:endParaRPr lang="es-AR"/>
@@ -1358,6 +1357,7 @@
           <a:p>
             <a:fld id="{5D54C5B7-6535-45F6-B87D-0A10CE9C57BD}" type="slidenum">
               <a:rPr lang="es-AR" smtClean="0"/>
+              <a:pPr/>
               <a:t>‹Nº›</a:t>
             </a:fld>
             <a:endParaRPr lang="es-AR"/>
@@ -1694,6 +1694,7 @@
           <a:p>
             <a:fld id="{37257250-85BF-4CE9-8829-60D0CC99FEAA}" type="datetimeFigureOut">
               <a:rPr lang="es-AR" smtClean="0"/>
+              <a:pPr/>
               <a:t>15/09/2013</a:t>
             </a:fld>
             <a:endParaRPr lang="es-AR"/>
@@ -1736,6 +1737,7 @@
           <a:p>
             <a:fld id="{5D54C5B7-6535-45F6-B87D-0A10CE9C57BD}" type="slidenum">
               <a:rPr lang="es-AR" smtClean="0"/>
+              <a:pPr/>
               <a:t>‹Nº›</a:t>
             </a:fld>
             <a:endParaRPr lang="es-AR"/>
@@ -1844,6 +1846,7 @@
           <a:p>
             <a:fld id="{37257250-85BF-4CE9-8829-60D0CC99FEAA}" type="datetimeFigureOut">
               <a:rPr lang="es-AR" smtClean="0"/>
+              <a:pPr/>
               <a:t>15/09/2013</a:t>
             </a:fld>
             <a:endParaRPr lang="es-AR"/>
@@ -1886,6 +1889,7 @@
           <a:p>
             <a:fld id="{5D54C5B7-6535-45F6-B87D-0A10CE9C57BD}" type="slidenum">
               <a:rPr lang="es-AR" smtClean="0"/>
+              <a:pPr/>
               <a:t>‹Nº›</a:t>
             </a:fld>
             <a:endParaRPr lang="es-AR"/>
@@ -1934,6 +1938,7 @@
           <a:p>
             <a:fld id="{37257250-85BF-4CE9-8829-60D0CC99FEAA}" type="datetimeFigureOut">
               <a:rPr lang="es-AR" smtClean="0"/>
+              <a:pPr/>
               <a:t>15/09/2013</a:t>
             </a:fld>
             <a:endParaRPr lang="es-AR"/>
@@ -1976,6 +1981,7 @@
           <a:p>
             <a:fld id="{5D54C5B7-6535-45F6-B87D-0A10CE9C57BD}" type="slidenum">
               <a:rPr lang="es-AR" smtClean="0"/>
+              <a:pPr/>
               <a:t>‹Nº›</a:t>
             </a:fld>
             <a:endParaRPr lang="es-AR"/>
@@ -2195,6 +2201,7 @@
           <a:p>
             <a:fld id="{37257250-85BF-4CE9-8829-60D0CC99FEAA}" type="datetimeFigureOut">
               <a:rPr lang="es-AR" smtClean="0"/>
+              <a:pPr/>
               <a:t>15/09/2013</a:t>
             </a:fld>
             <a:endParaRPr lang="es-AR"/>
@@ -2237,6 +2244,7 @@
           <a:p>
             <a:fld id="{5D54C5B7-6535-45F6-B87D-0A10CE9C57BD}" type="slidenum">
               <a:rPr lang="es-AR" smtClean="0"/>
+              <a:pPr/>
               <a:t>‹Nº›</a:t>
             </a:fld>
             <a:endParaRPr lang="es-AR"/>
@@ -2483,6 +2491,7 @@
           <a:p>
             <a:fld id="{37257250-85BF-4CE9-8829-60D0CC99FEAA}" type="datetimeFigureOut">
               <a:rPr lang="es-AR" smtClean="0"/>
+              <a:pPr/>
               <a:t>15/09/2013</a:t>
             </a:fld>
             <a:endParaRPr lang="es-AR"/>
@@ -2530,6 +2539,7 @@
           <a:p>
             <a:fld id="{5D54C5B7-6535-45F6-B87D-0A10CE9C57BD}" type="slidenum">
               <a:rPr lang="es-AR" smtClean="0"/>
+              <a:pPr/>
               <a:t>‹Nº›</a:t>
             </a:fld>
             <a:endParaRPr lang="es-AR"/>
@@ -3254,6 +3264,7 @@
           <a:p>
             <a:fld id="{37257250-85BF-4CE9-8829-60D0CC99FEAA}" type="datetimeFigureOut">
               <a:rPr lang="es-AR" smtClean="0"/>
+              <a:pPr/>
               <a:t>15/09/2013</a:t>
             </a:fld>
             <a:endParaRPr lang="es-AR"/>
@@ -3332,6 +3343,7 @@
           <a:p>
             <a:fld id="{5D54C5B7-6535-45F6-B87D-0A10CE9C57BD}" type="slidenum">
               <a:rPr lang="es-AR" smtClean="0"/>
+              <a:pPr/>
               <a:t>‹Nº›</a:t>
             </a:fld>
             <a:endParaRPr lang="es-AR"/>
@@ -4000,11 +4012,7 @@
             </a:r>
             <a:r>
               <a:rPr lang="es-AR" dirty="0" smtClean="0"/>
-              <a:t>, </a:t>
-            </a:r>
-            <a:r>
-              <a:rPr lang="es-AR" dirty="0" smtClean="0"/>
-              <a:t>Damián</a:t>
+              <a:t>, Damián</a:t>
             </a:r>
           </a:p>
           <a:p>
@@ -4206,14 +4214,25 @@
         </p:spPr>
         <p:txBody>
           <a:bodyPr>
-            <a:normAutofit fontScale="85000" lnSpcReduction="20000"/>
+            <a:normAutofit/>
           </a:bodyPr>
           <a:lstStyle/>
           <a:p>
             <a:r>
               <a:rPr lang="es-AR" dirty="0" smtClean="0"/>
-              <a:t>Se escribieron y corrieron pruebas funcionales para la administración de usuarios.</a:t>
-            </a:r>
+              <a:t>Se escribieron y corrieron pruebas </a:t>
+            </a:r>
+            <a:r>
+              <a:rPr lang="es-AR" dirty="0" smtClean="0"/>
+              <a:t>funcionales.</a:t>
+            </a:r>
+          </a:p>
+          <a:p>
+            <a:r>
+              <a:rPr lang="es-AR" dirty="0" smtClean="0"/>
+              <a:t>Plantilla de prueba funcional:</a:t>
+            </a:r>
+            <a:endParaRPr lang="es-AR" dirty="0" smtClean="0"/>
           </a:p>
           <a:p>
             <a:pPr>
@@ -4221,8 +4240,9 @@
             </a:pPr>
             <a:r>
               <a:rPr lang="es-AR" sz="2800" b="1" i="1" dirty="0" smtClean="0"/>
-              <a:t>Prueba 1</a:t>
-            </a:r>
+              <a:t>Prueba N</a:t>
+            </a:r>
+            <a:endParaRPr lang="es-AR" sz="2800" b="1" i="1" dirty="0" smtClean="0"/>
           </a:p>
           <a:p>
             <a:pPr>
@@ -4230,12 +4250,17 @@
             </a:pPr>
             <a:r>
               <a:rPr lang="es-AR" sz="2800" i="1" dirty="0" smtClean="0"/>
-              <a:t>	El </a:t>
+              <a:t>	</a:t>
             </a:r>
             <a:r>
               <a:rPr lang="es-AR" sz="2800" i="1" dirty="0" smtClean="0"/>
-              <a:t>administrador no posee cuenta, o ingresa los datos de inicio de sesión de manera incorrecta.</a:t>
-            </a:r>
+              <a:t>&lt;</a:t>
+            </a:r>
+            <a:r>
+              <a:rPr lang="es-AR" sz="2800" i="1" dirty="0" smtClean="0"/>
+              <a:t>Contexto de la prueba&gt;.</a:t>
+            </a:r>
+            <a:endParaRPr lang="es-AR" sz="2800" i="1" dirty="0" smtClean="0"/>
           </a:p>
           <a:p>
             <a:pPr>
@@ -4251,12 +4276,9 @@
             <a:pPr lvl="1"/>
             <a:r>
               <a:rPr lang="es-AR" i="1" dirty="0" smtClean="0"/>
-              <a:t>La </a:t>
-            </a:r>
-            <a:r>
-              <a:rPr lang="es-AR" i="1" dirty="0" smtClean="0"/>
-              <a:t>aplicación rechaza a usuarios inexistentes</a:t>
-            </a:r>
+              <a:t>&lt;Criterios de aceptación&gt;</a:t>
+            </a:r>
+            <a:endParaRPr lang="es-AR" i="1" dirty="0" smtClean="0"/>
           </a:p>
           <a:p>
             <a:pPr>
@@ -4264,79 +4286,21 @@
             </a:pPr>
             <a:r>
               <a:rPr lang="es-AR" sz="2800" b="1" i="1" dirty="0" smtClean="0"/>
-              <a:t>Pasos:</a:t>
-            </a:r>
-            <a:endParaRPr lang="es-AR" sz="2800" i="1" dirty="0" smtClean="0"/>
-          </a:p>
-          <a:p>
-            <a:pPr marL="880110" lvl="1" indent="-514350">
-              <a:buFont typeface="+mj-lt"/>
-              <a:buAutoNum type="arabicPeriod"/>
-            </a:pPr>
+              <a:t>Pasos</a:t>
+            </a:r>
+            <a:r>
+              <a:rPr lang="es-AR" sz="2800" b="1" i="1" dirty="0" smtClean="0"/>
+              <a:t>:</a:t>
+            </a:r>
+            <a:endParaRPr lang="es-AR" sz="2800" b="1" i="1" dirty="0" smtClean="0"/>
+          </a:p>
+          <a:p>
+            <a:pPr lvl="1"/>
             <a:r>
               <a:rPr lang="es-AR" i="1" dirty="0" smtClean="0"/>
-              <a:t>El </a:t>
-            </a:r>
-            <a:r>
-              <a:rPr lang="es-AR" i="1" dirty="0" smtClean="0"/>
-              <a:t>administrador ingresa a la aplicación.</a:t>
-            </a:r>
-          </a:p>
-          <a:p>
-            <a:pPr marL="880110" lvl="1" indent="-514350">
-              <a:buFont typeface="+mj-lt"/>
-              <a:buAutoNum type="arabicPeriod"/>
-            </a:pPr>
-            <a:r>
-              <a:rPr lang="es-AR" i="1" dirty="0" smtClean="0"/>
-              <a:t>Se </a:t>
-            </a:r>
-            <a:r>
-              <a:rPr lang="es-AR" i="1" dirty="0" smtClean="0"/>
-              <a:t>muestra la pantalla de inicio de sesión.</a:t>
-            </a:r>
-          </a:p>
-          <a:p>
-            <a:pPr marL="880110" lvl="1" indent="-514350">
-              <a:buFont typeface="+mj-lt"/>
-              <a:buAutoNum type="arabicPeriod"/>
-            </a:pPr>
-            <a:r>
-              <a:rPr lang="es-AR" i="1" dirty="0" smtClean="0"/>
-              <a:t>El administrador </a:t>
-            </a:r>
-            <a:r>
-              <a:rPr lang="es-AR" i="1" dirty="0" smtClean="0"/>
-              <a:t>ingresa datos inválidos.</a:t>
-            </a:r>
-          </a:p>
-          <a:p>
-            <a:pPr marL="880110" lvl="1" indent="-514350">
-              <a:buFont typeface="+mj-lt"/>
-              <a:buAutoNum type="arabicPeriod"/>
-            </a:pPr>
-            <a:r>
-              <a:rPr lang="es-AR" i="1" dirty="0" smtClean="0"/>
-              <a:t>El </a:t>
-            </a:r>
-            <a:r>
-              <a:rPr lang="es-AR" i="1" dirty="0" smtClean="0"/>
-              <a:t>administrador presiona el botón “Iniciar Sesión”</a:t>
-            </a:r>
-          </a:p>
-          <a:p>
-            <a:pPr marL="880110" lvl="1" indent="-514350">
-              <a:buFont typeface="+mj-lt"/>
-              <a:buAutoNum type="arabicPeriod"/>
-            </a:pPr>
-            <a:r>
-              <a:rPr lang="es-AR" i="1" dirty="0" smtClean="0"/>
-              <a:t>La </a:t>
-            </a:r>
-            <a:r>
-              <a:rPr lang="es-AR" i="1" dirty="0" smtClean="0"/>
-              <a:t>aplicación muestra un mensaje de error de datos inválidos.</a:t>
-            </a:r>
+              <a:t>&lt;Pasos para realizar la prueba&gt;</a:t>
+            </a:r>
+            <a:endParaRPr lang="es-AR" i="1" dirty="0" smtClean="0"/>
           </a:p>
           <a:p>
             <a:endParaRPr lang="es-AR" dirty="0"/>
@@ -4370,6 +4334,35 @@
       </p:grpSpPr>
       <p:sp>
         <p:nvSpPr>
+          <p:cNvPr id="2" name="1 Título"/>
+          <p:cNvSpPr>
+            <a:spLocks noGrp="1"/>
+          </p:cNvSpPr>
+          <p:nvPr>
+            <p:ph type="title"/>
+          </p:nvPr>
+        </p:nvSpPr>
+        <p:spPr>
+          <a:xfrm>
+            <a:off x="457200" y="285728"/>
+            <a:ext cx="8229600" cy="1143000"/>
+          </a:xfrm>
+        </p:spPr>
+        <p:txBody>
+          <a:bodyPr/>
+          <a:lstStyle/>
+          <a:p>
+            <a:pPr algn="ctr"/>
+            <a:r>
+              <a:rPr lang="es-AR" dirty="0" smtClean="0"/>
+              <a:t>Sprint 1 – Pruebas Funcionales</a:t>
+            </a:r>
+            <a:endParaRPr lang="es-AR" dirty="0"/>
+          </a:p>
+        </p:txBody>
+      </p:sp>
+      <p:sp>
+        <p:nvSpPr>
           <p:cNvPr id="3" name="2 Marcador de contenido"/>
           <p:cNvSpPr>
             <a:spLocks noGrp="1"/>
@@ -4381,7 +4374,7 @@
         <p:spPr>
           <a:xfrm>
             <a:off x="457200" y="1571612"/>
-            <a:ext cx="8229600" cy="4389120"/>
+            <a:ext cx="8229600" cy="1714512"/>
           </a:xfrm>
         </p:spPr>
         <p:txBody>
@@ -4394,172 +4387,78 @@
               <a:buNone/>
             </a:pPr>
             <a:r>
-              <a:rPr lang="es-AR" sz="2800" b="1" i="1" dirty="0" smtClean="0"/>
-              <a:t>Prueba </a:t>
-            </a:r>
-            <a:r>
-              <a:rPr lang="es-AR" sz="2800" b="1" i="1" dirty="0" smtClean="0"/>
-              <a:t>2</a:t>
-            </a:r>
-          </a:p>
-          <a:p>
-            <a:pPr>
-              <a:buNone/>
-            </a:pPr>
-            <a:r>
-              <a:rPr lang="es-AR" sz="2800" i="1" dirty="0" smtClean="0"/>
-              <a:t>	El </a:t>
-            </a:r>
-            <a:r>
-              <a:rPr lang="es-AR" sz="2800" i="1" dirty="0" smtClean="0"/>
-              <a:t>administrador ingresa de manera correcto los datos de </a:t>
-            </a:r>
-            <a:r>
-              <a:rPr lang="es-AR" sz="2800" i="1" dirty="0" smtClean="0"/>
-              <a:t>inicio de </a:t>
-            </a:r>
-            <a:r>
-              <a:rPr lang="es-AR" sz="2800" i="1" dirty="0" smtClean="0"/>
-              <a:t>sesión.</a:t>
-            </a:r>
-          </a:p>
-          <a:p>
-            <a:pPr>
-              <a:buNone/>
-            </a:pPr>
-            <a:r>
-              <a:rPr lang="es-AR" sz="2800" b="1" i="1" dirty="0" smtClean="0"/>
-              <a:t>Criterios de aceptación:</a:t>
-            </a:r>
-            <a:endParaRPr lang="es-AR" sz="2800" i="1" dirty="0" smtClean="0"/>
-          </a:p>
-          <a:p>
-            <a:pPr lvl="1"/>
-            <a:r>
-              <a:rPr lang="es-AR" i="1" dirty="0" smtClean="0"/>
-              <a:t>La </a:t>
-            </a:r>
-            <a:r>
-              <a:rPr lang="es-AR" i="1" dirty="0" smtClean="0"/>
-              <a:t>aplicación valida al usuario y muestra la pantalla principal.</a:t>
-            </a:r>
-          </a:p>
-          <a:p>
-            <a:pPr>
-              <a:buNone/>
-            </a:pPr>
-            <a:r>
-              <a:rPr lang="es-AR" sz="2800" b="1" i="1" dirty="0" smtClean="0"/>
-              <a:t>Pasos:</a:t>
-            </a:r>
-            <a:endParaRPr lang="es-AR" sz="2800" i="1" dirty="0" smtClean="0"/>
-          </a:p>
-          <a:p>
-            <a:pPr marL="880110" lvl="1" indent="-514350">
-              <a:buFont typeface="+mj-lt"/>
-              <a:buAutoNum type="arabicPeriod"/>
-            </a:pPr>
-            <a:r>
-              <a:rPr lang="es-AR" i="1" dirty="0" smtClean="0"/>
-              <a:t>El </a:t>
-            </a:r>
-            <a:r>
-              <a:rPr lang="es-AR" i="1" dirty="0" smtClean="0"/>
-              <a:t>administrador ingresa a la aplicación.</a:t>
-            </a:r>
-          </a:p>
-          <a:p>
-            <a:pPr marL="880110" lvl="1" indent="-514350">
-              <a:buFont typeface="+mj-lt"/>
-              <a:buAutoNum type="arabicPeriod"/>
-            </a:pPr>
-            <a:r>
-              <a:rPr lang="es-AR" i="1" dirty="0" smtClean="0"/>
-              <a:t>Se </a:t>
-            </a:r>
-            <a:r>
-              <a:rPr lang="es-AR" i="1" dirty="0" smtClean="0"/>
-              <a:t>muestra la pantalla de inicio de sesión.</a:t>
-            </a:r>
-          </a:p>
-          <a:p>
-            <a:pPr marL="880110" lvl="1" indent="-514350">
-              <a:buFont typeface="+mj-lt"/>
-              <a:buAutoNum type="arabicPeriod"/>
-            </a:pPr>
-            <a:r>
-              <a:rPr lang="es-AR" i="1" dirty="0" smtClean="0"/>
-              <a:t>El </a:t>
-            </a:r>
-            <a:r>
-              <a:rPr lang="es-AR" i="1" dirty="0" smtClean="0"/>
-              <a:t>administrador ingresa datos válidos.</a:t>
-            </a:r>
-          </a:p>
-          <a:p>
-            <a:pPr marL="880110" lvl="1" indent="-514350">
-              <a:buFont typeface="+mj-lt"/>
-              <a:buAutoNum type="arabicPeriod"/>
-            </a:pPr>
-            <a:r>
-              <a:rPr lang="es-AR" i="1" dirty="0" smtClean="0"/>
-              <a:t>El </a:t>
-            </a:r>
-            <a:r>
-              <a:rPr lang="es-AR" i="1" dirty="0" smtClean="0"/>
-              <a:t>administrador presiona el botón de “Iniciar Sesión”.</a:t>
-            </a:r>
-          </a:p>
-          <a:p>
-            <a:pPr marL="880110" lvl="1" indent="-514350">
-              <a:buFont typeface="+mj-lt"/>
-              <a:buAutoNum type="arabicPeriod"/>
-            </a:pPr>
-            <a:r>
-              <a:rPr lang="es-AR" i="1" dirty="0" smtClean="0"/>
-              <a:t>La </a:t>
-            </a:r>
-            <a:r>
-              <a:rPr lang="es-AR" i="1" dirty="0" smtClean="0"/>
-              <a:t>aplicación muestra la pantalla principal</a:t>
-            </a:r>
-            <a:r>
-              <a:rPr lang="es-AR" i="1" dirty="0" smtClean="0"/>
-              <a:t>.</a:t>
-            </a:r>
-            <a:endParaRPr lang="es-AR" i="1" dirty="0" smtClean="0"/>
-          </a:p>
-        </p:txBody>
-      </p:sp>
-      <p:sp>
-        <p:nvSpPr>
-          <p:cNvPr id="4" name="1 Título"/>
-          <p:cNvSpPr>
-            <a:spLocks noGrp="1"/>
-          </p:cNvSpPr>
-          <p:nvPr>
-            <p:ph type="title"/>
-          </p:nvPr>
-        </p:nvSpPr>
-        <p:spPr>
-          <a:xfrm>
-            <a:off x="457200" y="285728"/>
-            <a:ext cx="8229600" cy="1143000"/>
-          </a:xfrm>
-        </p:spPr>
-        <p:txBody>
-          <a:bodyPr/>
-          <a:lstStyle/>
-          <a:p>
-            <a:pPr algn="ctr"/>
-            <a:r>
               <a:rPr lang="es-AR" dirty="0" smtClean="0"/>
-              <a:t>Sprint 1 – Pruebas Funcionales</a:t>
-            </a:r>
-            <a:endParaRPr lang="es-AR" dirty="0"/>
-          </a:p>
-        </p:txBody>
-      </p:sp>
+              <a:t>Su resultado se guardo en una planilla con los campos:</a:t>
+            </a:r>
+          </a:p>
+          <a:p>
+            <a:r>
+              <a:rPr lang="es-AR" dirty="0" smtClean="0"/>
+              <a:t>ID de prueba funcional.</a:t>
+            </a:r>
+          </a:p>
+          <a:p>
+            <a:r>
+              <a:rPr lang="es-AR" dirty="0" smtClean="0"/>
+              <a:t>Estado de la prueba por f</a:t>
+            </a:r>
+            <a:r>
+              <a:rPr lang="es-AR" dirty="0" smtClean="0"/>
+              <a:t>echa de realización.</a:t>
+            </a:r>
+          </a:p>
+          <a:p>
+            <a:r>
+              <a:rPr lang="es-AR" dirty="0" err="1" smtClean="0"/>
+              <a:t>Bugs</a:t>
+            </a:r>
+            <a:r>
+              <a:rPr lang="es-AR" dirty="0" smtClean="0"/>
+              <a:t> encontrados en la corrida.</a:t>
+            </a:r>
+            <a:endParaRPr lang="es-AR" dirty="0" smtClean="0"/>
+          </a:p>
+          <a:p>
+            <a:endParaRPr lang="es-AR" dirty="0" smtClean="0"/>
+          </a:p>
+          <a:p>
+            <a:endParaRPr lang="es-AR" dirty="0" smtClean="0"/>
+          </a:p>
+        </p:txBody>
+      </p:sp>
+      <p:pic>
+        <p:nvPicPr>
+          <p:cNvPr id="4" name="Picture 2"/>
+          <p:cNvPicPr>
+            <a:picLocks noChangeAspect="1" noChangeArrowheads="1"/>
+          </p:cNvPicPr>
+          <p:nvPr/>
+        </p:nvPicPr>
+        <p:blipFill>
+          <a:blip r:embed="rId2"/>
+          <a:srcRect/>
+          <a:stretch>
+            <a:fillRect/>
+          </a:stretch>
+        </p:blipFill>
+        <p:spPr bwMode="auto">
+          <a:xfrm>
+            <a:off x="2285984" y="3357562"/>
+            <a:ext cx="4500594" cy="3214710"/>
+          </a:xfrm>
+          <a:prstGeom prst="rect">
+            <a:avLst/>
+          </a:prstGeom>
+          <a:noFill/>
+          <a:ln w="9525">
+            <a:noFill/>
+            <a:miter lim="800000"/>
+            <a:headEnd/>
+            <a:tailEnd/>
+          </a:ln>
+          <a:effectLst/>
+        </p:spPr>
+      </p:pic>
     </p:spTree>
   </p:cSld>
   <p:clrMapOvr>
@@ -4587,6 +4486,35 @@
       </p:grpSpPr>
       <p:sp>
         <p:nvSpPr>
+          <p:cNvPr id="2" name="1 Título"/>
+          <p:cNvSpPr>
+            <a:spLocks noGrp="1"/>
+          </p:cNvSpPr>
+          <p:nvPr>
+            <p:ph type="title"/>
+          </p:nvPr>
+        </p:nvSpPr>
+        <p:spPr>
+          <a:xfrm>
+            <a:off x="457200" y="357166"/>
+            <a:ext cx="8229600" cy="1143000"/>
+          </a:xfrm>
+        </p:spPr>
+        <p:txBody>
+          <a:bodyPr/>
+          <a:lstStyle/>
+          <a:p>
+            <a:pPr algn="ctr"/>
+            <a:r>
+              <a:rPr lang="es-AR" dirty="0" smtClean="0"/>
+              <a:t>Sprint 1 – Lecciones Aprendidas</a:t>
+            </a:r>
+            <a:endParaRPr lang="es-AR" dirty="0"/>
+          </a:p>
+        </p:txBody>
+      </p:sp>
+      <p:sp>
+        <p:nvSpPr>
           <p:cNvPr id="3" name="2 Marcador de contenido"/>
           <p:cNvSpPr>
             <a:spLocks noGrp="1"/>
@@ -4595,181 +4523,36 @@
             <p:ph idx="1"/>
           </p:nvPr>
         </p:nvSpPr>
-        <p:spPr>
-          <a:xfrm>
-            <a:off x="457200" y="1571612"/>
-            <a:ext cx="8229600" cy="4389120"/>
-          </a:xfrm>
-        </p:spPr>
-        <p:txBody>
-          <a:bodyPr>
-            <a:normAutofit fontScale="92500" lnSpcReduction="20000"/>
-          </a:bodyPr>
-          <a:lstStyle/>
-          <a:p>
-            <a:pPr>
-              <a:buNone/>
-            </a:pPr>
-            <a:r>
-              <a:rPr lang="es-AR" sz="2800" b="1" i="1" dirty="0" smtClean="0"/>
-              <a:t>Prueba 3</a:t>
-            </a:r>
-          </a:p>
-          <a:p>
-            <a:pPr>
-              <a:buNone/>
-            </a:pPr>
-            <a:r>
-              <a:rPr lang="es-AR" sz="2800" i="1" dirty="0" smtClean="0"/>
-              <a:t>	El</a:t>
-            </a:r>
-            <a:r>
-              <a:rPr lang="es-AR" sz="2800" i="1" dirty="0" smtClean="0"/>
-              <a:t> </a:t>
-            </a:r>
-            <a:r>
-              <a:rPr lang="es-AR" sz="2800" i="1" dirty="0" smtClean="0"/>
-              <a:t>administrador </a:t>
-            </a:r>
-            <a:r>
-              <a:rPr lang="es-AR" sz="2800" i="1" dirty="0" smtClean="0"/>
-              <a:t>desea listar todos los usuarios existentes.</a:t>
-            </a:r>
-          </a:p>
-          <a:p>
-            <a:pPr>
-              <a:buNone/>
-            </a:pPr>
-            <a:r>
-              <a:rPr lang="es-AR" sz="2800" b="1" i="1" dirty="0" smtClean="0"/>
-              <a:t>Criterios de aceptación:</a:t>
-            </a:r>
-            <a:endParaRPr lang="es-AR" sz="2800" i="1" dirty="0" smtClean="0"/>
-          </a:p>
-          <a:p>
-            <a:pPr lvl="1"/>
-            <a:r>
-              <a:rPr lang="es-AR" i="1" dirty="0" smtClean="0"/>
-              <a:t>La </a:t>
-            </a:r>
-            <a:r>
-              <a:rPr lang="es-AR" i="1" dirty="0" smtClean="0"/>
-              <a:t>aplicación muestra la lista de usuarios existentes </a:t>
-            </a:r>
-            <a:r>
-              <a:rPr lang="es-AR" i="1" dirty="0" smtClean="0"/>
-              <a:t>al momento</a:t>
-            </a:r>
-            <a:r>
-              <a:rPr lang="es-AR" i="1" dirty="0" smtClean="0"/>
-              <a:t>.</a:t>
-            </a:r>
-          </a:p>
-          <a:p>
-            <a:pPr>
-              <a:buNone/>
-            </a:pPr>
-            <a:r>
-              <a:rPr lang="es-AR" sz="2800" b="1" i="1" dirty="0" smtClean="0"/>
-              <a:t>Pasos:</a:t>
-            </a:r>
-            <a:endParaRPr lang="es-AR" sz="2800" i="1" dirty="0" smtClean="0"/>
-          </a:p>
-          <a:p>
-            <a:pPr marL="880110" lvl="1" indent="-514350">
-              <a:buFont typeface="+mj-lt"/>
-              <a:buAutoNum type="arabicPeriod"/>
-            </a:pPr>
-            <a:r>
-              <a:rPr lang="es-AR" i="1" dirty="0" smtClean="0"/>
-              <a:t>El </a:t>
-            </a:r>
-            <a:r>
-              <a:rPr lang="es-AR" i="1" dirty="0" smtClean="0"/>
-              <a:t>administrador inicia la sesión en la aplicación.</a:t>
-            </a:r>
-          </a:p>
-          <a:p>
-            <a:pPr marL="880110" lvl="1" indent="-514350">
-              <a:buFont typeface="+mj-lt"/>
-              <a:buAutoNum type="arabicPeriod"/>
-            </a:pPr>
-            <a:r>
-              <a:rPr lang="es-AR" i="1" dirty="0" smtClean="0"/>
-              <a:t>El </a:t>
-            </a:r>
-            <a:r>
-              <a:rPr lang="es-AR" i="1" dirty="0" smtClean="0"/>
-              <a:t>administrador presiona el botón de “Usuarios”</a:t>
-            </a:r>
-          </a:p>
-          <a:p>
-            <a:pPr marL="880110" lvl="1" indent="-514350">
-              <a:buFont typeface="+mj-lt"/>
-              <a:buAutoNum type="arabicPeriod"/>
-            </a:pPr>
-            <a:r>
-              <a:rPr lang="es-AR" i="1" dirty="0" smtClean="0"/>
-              <a:t>El </a:t>
-            </a:r>
-            <a:r>
-              <a:rPr lang="es-AR" i="1" dirty="0" smtClean="0"/>
-              <a:t>administrador presiona el botón de “Buscar”</a:t>
-            </a:r>
-          </a:p>
-          <a:p>
-            <a:pPr marL="880110" lvl="1" indent="-514350">
-              <a:buFont typeface="+mj-lt"/>
-              <a:buAutoNum type="arabicPeriod"/>
-            </a:pPr>
-            <a:r>
-              <a:rPr lang="es-AR" i="1" dirty="0" smtClean="0"/>
-              <a:t>La </a:t>
-            </a:r>
-            <a:r>
-              <a:rPr lang="es-AR" i="1" dirty="0" smtClean="0"/>
-              <a:t>aplicación muestra un listado de todos los usuarios </a:t>
-            </a:r>
-            <a:r>
-              <a:rPr lang="es-AR" i="1" dirty="0" smtClean="0"/>
-              <a:t>que se </a:t>
-            </a:r>
-            <a:r>
-              <a:rPr lang="es-AR" i="1" dirty="0" smtClean="0"/>
-              <a:t>han registrado de manera exitosa</a:t>
-            </a:r>
-            <a:r>
-              <a:rPr lang="es-AR" i="1" dirty="0" smtClean="0"/>
-              <a:t>.</a:t>
-            </a:r>
-            <a:endParaRPr lang="es-AR" i="1" dirty="0" smtClean="0"/>
-          </a:p>
-        </p:txBody>
-      </p:sp>
-      <p:sp>
-        <p:nvSpPr>
-          <p:cNvPr id="4" name="1 Título"/>
-          <p:cNvSpPr>
-            <a:spLocks noGrp="1"/>
-          </p:cNvSpPr>
-          <p:nvPr>
-            <p:ph type="title"/>
-          </p:nvPr>
-        </p:nvSpPr>
-        <p:spPr>
-          <a:xfrm>
-            <a:off x="457200" y="285728"/>
-            <a:ext cx="8229600" cy="1143000"/>
-          </a:xfrm>
-        </p:spPr>
+        <p:spPr/>
         <p:txBody>
           <a:bodyPr/>
           <a:lstStyle/>
           <a:p>
-            <a:pPr algn="ctr"/>
             <a:r>
               <a:rPr lang="es-AR" dirty="0" smtClean="0"/>
-              <a:t>Sprint 1 – Pruebas Funcionales</a:t>
+              <a:t>Complejidad en el uso de tecnologías muy recientes (</a:t>
+            </a:r>
+            <a:r>
+              <a:rPr lang="es-AR" dirty="0" err="1" smtClean="0"/>
+              <a:t>Android</a:t>
+            </a:r>
+            <a:r>
+              <a:rPr lang="es-AR" dirty="0" smtClean="0"/>
+              <a:t> Studio + </a:t>
+            </a:r>
+            <a:r>
+              <a:rPr lang="es-AR" dirty="0" err="1" smtClean="0"/>
+              <a:t>RoboLetric</a:t>
+            </a:r>
+            <a:r>
+              <a:rPr lang="es-AR" dirty="0" smtClean="0"/>
+              <a:t>)</a:t>
+            </a:r>
+          </a:p>
+          <a:p>
+            <a:r>
+              <a:rPr lang="es-AR" dirty="0" smtClean="0"/>
+              <a:t>Comienzo de tareas menos prioritarias</a:t>
             </a:r>
             <a:endParaRPr lang="es-AR" dirty="0"/>
           </a:p>
@@ -4802,174 +4585,7 @@
       </p:grpSpPr>
       <p:sp>
         <p:nvSpPr>
-          <p:cNvPr id="3" name="2 Marcador de contenido"/>
-          <p:cNvSpPr>
-            <a:spLocks noGrp="1"/>
-          </p:cNvSpPr>
-          <p:nvPr>
-            <p:ph idx="1"/>
-          </p:nvPr>
-        </p:nvSpPr>
-        <p:spPr>
-          <a:xfrm>
-            <a:off x="457200" y="1571612"/>
-            <a:ext cx="8229600" cy="4389120"/>
-          </a:xfrm>
-        </p:spPr>
-        <p:txBody>
-          <a:bodyPr>
-            <a:normAutofit fontScale="77500" lnSpcReduction="20000"/>
-          </a:bodyPr>
-          <a:lstStyle/>
-          <a:p>
-            <a:pPr>
-              <a:buNone/>
-            </a:pPr>
-            <a:r>
-              <a:rPr lang="es-AR" sz="2800" b="1" i="1" dirty="0" smtClean="0"/>
-              <a:t>Prueba 4</a:t>
-            </a:r>
-          </a:p>
-          <a:p>
-            <a:pPr>
-              <a:buNone/>
-            </a:pPr>
-            <a:r>
-              <a:rPr lang="es-AR" sz="2800" i="1" dirty="0" smtClean="0"/>
-              <a:t>	El </a:t>
-            </a:r>
-            <a:r>
-              <a:rPr lang="es-AR" sz="2800" i="1" dirty="0" smtClean="0"/>
-              <a:t>administrador desea obtener un listado de usuarios existentes, filtrado por el campo D.N.I.</a:t>
-            </a:r>
-          </a:p>
-          <a:p>
-            <a:pPr>
-              <a:buNone/>
-            </a:pPr>
-            <a:r>
-              <a:rPr lang="es-AR" sz="2800" b="1" i="1" dirty="0" smtClean="0"/>
-              <a:t>Criterios de aceptación:</a:t>
-            </a:r>
-            <a:endParaRPr lang="es-AR" sz="2800" i="1" dirty="0" smtClean="0"/>
-          </a:p>
-          <a:p>
-            <a:pPr lvl="1"/>
-            <a:r>
-              <a:rPr lang="es-AR" i="1" dirty="0" smtClean="0"/>
-              <a:t>La </a:t>
-            </a:r>
-            <a:r>
-              <a:rPr lang="es-AR" i="1" dirty="0" smtClean="0"/>
-              <a:t>aplicación muestra la lista de usuarios existentes, que </a:t>
-            </a:r>
-            <a:r>
-              <a:rPr lang="es-AR" i="1" dirty="0" smtClean="0"/>
-              <a:t>coinciden </a:t>
-            </a:r>
-            <a:r>
-              <a:rPr lang="es-AR" i="1" dirty="0" smtClean="0"/>
-              <a:t>con el campo D.N.I. solicitado.</a:t>
-            </a:r>
-          </a:p>
-          <a:p>
-            <a:pPr>
-              <a:buNone/>
-            </a:pPr>
-            <a:r>
-              <a:rPr lang="es-AR" sz="2800" b="1" i="1" dirty="0" smtClean="0"/>
-              <a:t>Pasos:</a:t>
-            </a:r>
-            <a:endParaRPr lang="es-AR" sz="2800" i="1" dirty="0" smtClean="0"/>
-          </a:p>
-          <a:p>
-            <a:pPr marL="880110" lvl="1" indent="-514350">
-              <a:buFont typeface="+mj-lt"/>
-              <a:buAutoNum type="arabicPeriod"/>
-            </a:pPr>
-            <a:r>
-              <a:rPr lang="es-AR" i="1" dirty="0" smtClean="0"/>
-              <a:t>El </a:t>
-            </a:r>
-            <a:r>
-              <a:rPr lang="es-AR" i="1" dirty="0" smtClean="0"/>
-              <a:t>administrador inicia la sesión en la aplicación.</a:t>
-            </a:r>
-          </a:p>
-          <a:p>
-            <a:pPr marL="880110" lvl="1" indent="-514350">
-              <a:buFont typeface="+mj-lt"/>
-              <a:buAutoNum type="arabicPeriod"/>
-            </a:pPr>
-            <a:r>
-              <a:rPr lang="es-AR" i="1" dirty="0" smtClean="0"/>
-              <a:t>El </a:t>
-            </a:r>
-            <a:r>
-              <a:rPr lang="es-AR" i="1" dirty="0" smtClean="0"/>
-              <a:t>administrador presiona el botón de “Usuarios”</a:t>
-            </a:r>
-          </a:p>
-          <a:p>
-            <a:pPr marL="880110" lvl="1" indent="-514350">
-              <a:buFont typeface="+mj-lt"/>
-              <a:buAutoNum type="arabicPeriod"/>
-            </a:pPr>
-            <a:r>
-              <a:rPr lang="es-AR" i="1" dirty="0" smtClean="0"/>
-              <a:t>El </a:t>
-            </a:r>
-            <a:r>
-              <a:rPr lang="es-AR" i="1" dirty="0" smtClean="0"/>
-              <a:t>administrador llena el campo “D.N.I.” con el valor que quiere filtrar.</a:t>
-            </a:r>
-          </a:p>
-          <a:p>
-            <a:pPr marL="880110" lvl="1" indent="-514350">
-              <a:buFont typeface="+mj-lt"/>
-              <a:buAutoNum type="arabicPeriod"/>
-            </a:pPr>
-            <a:r>
-              <a:rPr lang="es-AR" i="1" dirty="0" smtClean="0"/>
-              <a:t>El administrador </a:t>
-            </a:r>
-            <a:r>
-              <a:rPr lang="es-AR" i="1" dirty="0" smtClean="0"/>
-              <a:t>presiona el botón de “Buscar”</a:t>
-            </a:r>
-          </a:p>
-          <a:p>
-            <a:pPr marL="880110" lvl="1" indent="-514350">
-              <a:buFont typeface="+mj-lt"/>
-              <a:buAutoNum type="arabicPeriod"/>
-            </a:pPr>
-            <a:r>
-              <a:rPr lang="es-AR" i="1" dirty="0" smtClean="0"/>
-              <a:t>La </a:t>
-            </a:r>
-            <a:r>
-              <a:rPr lang="es-AR" i="1" dirty="0" smtClean="0"/>
-              <a:t>aplicación muestra un listado de todos los usuarios que se han </a:t>
-            </a:r>
-            <a:r>
-              <a:rPr lang="es-AR" i="1" dirty="0" smtClean="0"/>
-              <a:t>registrado </a:t>
-            </a:r>
-            <a:r>
-              <a:rPr lang="es-AR" i="1" dirty="0" smtClean="0"/>
-              <a:t>de manera exitosa y coinciden con el campo D.N.I. </a:t>
-            </a:r>
-            <a:r>
-              <a:rPr lang="es-AR" i="1" dirty="0" smtClean="0"/>
-              <a:t>solicitado.</a:t>
-            </a:r>
-            <a:endParaRPr lang="es-AR" i="1" dirty="0" smtClean="0"/>
-          </a:p>
-        </p:txBody>
-      </p:sp>
-      <p:sp>
-        <p:nvSpPr>
-          <p:cNvPr id="4" name="1 Título"/>
+          <p:cNvPr id="2" name="1 Título"/>
           <p:cNvSpPr>
             <a:spLocks noGrp="1"/>
           </p:cNvSpPr>
@@ -4990,1291 +4606,36 @@
             <a:pPr algn="ctr"/>
             <a:r>
               <a:rPr lang="es-AR" dirty="0" smtClean="0"/>
-              <a:t>Sprint 1 – Pruebas Funcionales</a:t>
+              <a:t>Sprint 1 - Fin</a:t>
             </a:r>
             <a:endParaRPr lang="es-AR" dirty="0"/>
           </a:p>
         </p:txBody>
       </p:sp>
-    </p:spTree>
-  </p:cSld>
-  <p:clrMapOvr>
-    <a:masterClrMapping/>
-  </p:clrMapOvr>
-</p:sld>
-</file>
-
-<file path=ppt/slides/slide15.xml><?xml version="1.0" encoding="utf-8"?>
-<p:sld xmlns:a="http://schemas.openxmlformats.org/drawingml/2006/main" xmlns:r="http://schemas.openxmlformats.org/officeDocument/2006/relationships" xmlns:p="http://schemas.openxmlformats.org/presentationml/2006/main">
-  <p:cSld>
-    <p:spTree>
-      <p:nvGrpSpPr>
-        <p:cNvPr id="1" name=""/>
-        <p:cNvGrpSpPr/>
-        <p:nvPr/>
-      </p:nvGrpSpPr>
-      <p:grpSpPr>
-        <a:xfrm>
-          <a:off x="0" y="0"/>
-          <a:ext cx="0" cy="0"/>
-          <a:chOff x="0" y="0"/>
-          <a:chExt cx="0" cy="0"/>
-        </a:xfrm>
-      </p:grpSpPr>
-      <p:sp>
-        <p:nvSpPr>
-          <p:cNvPr id="3" name="2 Marcador de contenido"/>
-          <p:cNvSpPr>
-            <a:spLocks noGrp="1"/>
-          </p:cNvSpPr>
-          <p:nvPr>
-            <p:ph idx="1"/>
-          </p:nvPr>
-        </p:nvSpPr>
-        <p:spPr>
-          <a:xfrm>
-            <a:off x="457200" y="1500174"/>
-            <a:ext cx="8229600" cy="4389120"/>
-          </a:xfrm>
-        </p:spPr>
-        <p:txBody>
-          <a:bodyPr>
-            <a:normAutofit fontScale="77500" lnSpcReduction="20000"/>
-          </a:bodyPr>
-          <a:lstStyle/>
-          <a:p>
-            <a:pPr>
-              <a:buNone/>
-            </a:pPr>
-            <a:r>
-              <a:rPr lang="es-AR" sz="2800" b="1" i="1" dirty="0" smtClean="0"/>
-              <a:t>Prueba 5</a:t>
-            </a:r>
-          </a:p>
-          <a:p>
-            <a:pPr>
-              <a:buNone/>
-            </a:pPr>
-            <a:r>
-              <a:rPr lang="es-AR" sz="2800" i="1" dirty="0" smtClean="0"/>
-              <a:t>	El </a:t>
-            </a:r>
-            <a:r>
-              <a:rPr lang="es-AR" sz="2800" i="1" dirty="0" smtClean="0"/>
-              <a:t>administrador desea marcar como invalido a un usuario existente.</a:t>
-            </a:r>
-          </a:p>
-          <a:p>
-            <a:pPr>
-              <a:buNone/>
-            </a:pPr>
-            <a:r>
-              <a:rPr lang="es-AR" sz="2800" b="1" i="1" dirty="0" smtClean="0"/>
-              <a:t>Criterios de aceptación:</a:t>
-            </a:r>
-            <a:endParaRPr lang="es-AR" sz="2800" i="1" dirty="0" smtClean="0"/>
-          </a:p>
-          <a:p>
-            <a:pPr lvl="1"/>
-            <a:r>
-              <a:rPr lang="es-AR" i="1" dirty="0" smtClean="0"/>
-              <a:t>La </a:t>
-            </a:r>
-            <a:r>
-              <a:rPr lang="es-AR" i="1" dirty="0" smtClean="0"/>
-              <a:t>aplicación invalida al usuario, impidiendo su futuro inicio de sesión.</a:t>
-            </a:r>
-          </a:p>
-          <a:p>
-            <a:pPr>
-              <a:buNone/>
-            </a:pPr>
-            <a:r>
-              <a:rPr lang="es-AR" sz="2800" b="1" i="1" dirty="0" smtClean="0"/>
-              <a:t>Pasos:</a:t>
-            </a:r>
-            <a:endParaRPr lang="es-AR" sz="2800" i="1" dirty="0" smtClean="0"/>
-          </a:p>
-          <a:p>
-            <a:pPr marL="880110" lvl="1" indent="-514350">
-              <a:buFont typeface="+mj-lt"/>
-              <a:buAutoNum type="arabicPeriod"/>
-            </a:pPr>
-            <a:r>
-              <a:rPr lang="es-AR" i="1" dirty="0" smtClean="0"/>
-              <a:t>El </a:t>
-            </a:r>
-            <a:r>
-              <a:rPr lang="es-AR" i="1" dirty="0" smtClean="0"/>
-              <a:t>administrador inicia la sesión en la aplicación.</a:t>
-            </a:r>
-          </a:p>
-          <a:p>
-            <a:pPr marL="880110" lvl="1" indent="-514350">
-              <a:buFont typeface="+mj-lt"/>
-              <a:buAutoNum type="arabicPeriod"/>
-            </a:pPr>
-            <a:r>
-              <a:rPr lang="es-AR" i="1" dirty="0" smtClean="0"/>
-              <a:t>El </a:t>
-            </a:r>
-            <a:r>
-              <a:rPr lang="es-AR" i="1" dirty="0" smtClean="0"/>
-              <a:t>administrador presiona el botón de “Usuarios”</a:t>
-            </a:r>
-          </a:p>
-          <a:p>
-            <a:pPr marL="880110" lvl="1" indent="-514350">
-              <a:buFont typeface="+mj-lt"/>
-              <a:buAutoNum type="arabicPeriod"/>
-            </a:pPr>
-            <a:r>
-              <a:rPr lang="es-AR" i="1" dirty="0" smtClean="0"/>
-              <a:t>El </a:t>
-            </a:r>
-            <a:r>
-              <a:rPr lang="es-AR" i="1" dirty="0" smtClean="0"/>
-              <a:t>administrador presiona el botón de “Buscar”</a:t>
-            </a:r>
-          </a:p>
-          <a:p>
-            <a:pPr marL="1124712" lvl="2" indent="-457200">
-              <a:buFont typeface="+mj-lt"/>
-              <a:buAutoNum type="arabicPeriod"/>
-            </a:pPr>
-            <a:r>
-              <a:rPr lang="es-AR" i="1" dirty="0" smtClean="0"/>
-              <a:t>Opcionalmente </a:t>
-            </a:r>
-            <a:r>
-              <a:rPr lang="es-AR" i="1" dirty="0" smtClean="0"/>
-              <a:t>puede filtrar por el campo “D.N.I.”</a:t>
-            </a:r>
-          </a:p>
-          <a:p>
-            <a:pPr marL="880110" lvl="1" indent="-514350">
-              <a:buFont typeface="+mj-lt"/>
-              <a:buAutoNum type="arabicPeriod"/>
-            </a:pPr>
-            <a:r>
-              <a:rPr lang="es-AR" i="1" dirty="0" smtClean="0"/>
-              <a:t>La </a:t>
-            </a:r>
-            <a:r>
-              <a:rPr lang="es-AR" i="1" dirty="0" smtClean="0"/>
-              <a:t>aplicación muestra un listado de usuarios existentes.</a:t>
-            </a:r>
-          </a:p>
-          <a:p>
-            <a:pPr marL="880110" lvl="1" indent="-514350">
-              <a:buFont typeface="+mj-lt"/>
-              <a:buAutoNum type="arabicPeriod"/>
-            </a:pPr>
-            <a:r>
-              <a:rPr lang="es-AR" i="1" dirty="0" smtClean="0"/>
-              <a:t>El </a:t>
-            </a:r>
-            <a:r>
-              <a:rPr lang="es-AR" i="1" dirty="0" smtClean="0"/>
-              <a:t>administrador presiona el botón de “Invalidar”</a:t>
-            </a:r>
-          </a:p>
-          <a:p>
-            <a:pPr marL="880110" lvl="1" indent="-514350">
-              <a:buFont typeface="+mj-lt"/>
-              <a:buAutoNum type="arabicPeriod"/>
-            </a:pPr>
-            <a:r>
-              <a:rPr lang="es-AR" i="1" dirty="0" smtClean="0"/>
-              <a:t>La </a:t>
-            </a:r>
-            <a:r>
-              <a:rPr lang="es-AR" i="1" dirty="0" smtClean="0"/>
-              <a:t>aplicación muestra al usuario como invalidado</a:t>
-            </a:r>
-            <a:r>
-              <a:rPr lang="es-AR" i="1" dirty="0" smtClean="0"/>
-              <a:t>.</a:t>
-            </a:r>
-            <a:endParaRPr lang="es-AR" i="1" dirty="0" smtClean="0"/>
-          </a:p>
-        </p:txBody>
-      </p:sp>
-      <p:sp>
-        <p:nvSpPr>
-          <p:cNvPr id="4" name="1 Título"/>
-          <p:cNvSpPr>
-            <a:spLocks noGrp="1"/>
-          </p:cNvSpPr>
-          <p:nvPr>
-            <p:ph type="title"/>
-          </p:nvPr>
-        </p:nvSpPr>
-        <p:spPr>
-          <a:xfrm>
-            <a:off x="457200" y="285728"/>
-            <a:ext cx="8229600" cy="1143000"/>
-          </a:xfrm>
-        </p:spPr>
-        <p:txBody>
-          <a:bodyPr/>
-          <a:lstStyle/>
-          <a:p>
-            <a:pPr algn="ctr"/>
-            <a:r>
-              <a:rPr lang="es-AR" dirty="0" smtClean="0"/>
-              <a:t>Sprint 1 – Pruebas Funcionales</a:t>
-            </a:r>
-            <a:endParaRPr lang="es-AR" dirty="0"/>
-          </a:p>
-        </p:txBody>
-      </p:sp>
-    </p:spTree>
-  </p:cSld>
-  <p:clrMapOvr>
-    <a:masterClrMapping/>
-  </p:clrMapOvr>
-</p:sld>
-</file>
-
-<file path=ppt/slides/slide16.xml><?xml version="1.0" encoding="utf-8"?>
-<p:sld xmlns:a="http://schemas.openxmlformats.org/drawingml/2006/main" xmlns:r="http://schemas.openxmlformats.org/officeDocument/2006/relationships" xmlns:p="http://schemas.openxmlformats.org/presentationml/2006/main">
-  <p:cSld>
-    <p:spTree>
-      <p:nvGrpSpPr>
-        <p:cNvPr id="1" name=""/>
-        <p:cNvGrpSpPr/>
-        <p:nvPr/>
-      </p:nvGrpSpPr>
-      <p:grpSpPr>
-        <a:xfrm>
-          <a:off x="0" y="0"/>
-          <a:ext cx="0" cy="0"/>
-          <a:chOff x="0" y="0"/>
-          <a:chExt cx="0" cy="0"/>
-        </a:xfrm>
-      </p:grpSpPr>
-      <p:sp>
-        <p:nvSpPr>
-          <p:cNvPr id="3" name="2 Marcador de contenido"/>
-          <p:cNvSpPr>
-            <a:spLocks noGrp="1"/>
-          </p:cNvSpPr>
-          <p:nvPr>
-            <p:ph idx="1"/>
-          </p:nvPr>
-        </p:nvSpPr>
-        <p:spPr>
-          <a:xfrm>
-            <a:off x="457200" y="1571612"/>
-            <a:ext cx="8229600" cy="4389120"/>
-          </a:xfrm>
-        </p:spPr>
-        <p:txBody>
-          <a:bodyPr>
-            <a:normAutofit fontScale="77500" lnSpcReduction="20000"/>
-          </a:bodyPr>
-          <a:lstStyle/>
-          <a:p>
-            <a:pPr>
-              <a:buNone/>
-            </a:pPr>
-            <a:r>
-              <a:rPr lang="es-AR" sz="2800" b="1" i="1" dirty="0" smtClean="0"/>
-              <a:t>Prueba 6</a:t>
-            </a:r>
-          </a:p>
-          <a:p>
-            <a:pPr>
-              <a:buNone/>
-            </a:pPr>
-            <a:r>
-              <a:rPr lang="es-AR" sz="2800" i="1" dirty="0" smtClean="0"/>
-              <a:t>	El </a:t>
-            </a:r>
-            <a:r>
-              <a:rPr lang="es-AR" sz="2800" i="1" dirty="0" smtClean="0"/>
-              <a:t>administrador desea marcar como valido a un usuario existente que </a:t>
-            </a:r>
-            <a:r>
-              <a:rPr lang="es-AR" sz="2800" i="1" dirty="0" smtClean="0"/>
-              <a:t>se encuentra </a:t>
-            </a:r>
-            <a:r>
-              <a:rPr lang="es-AR" sz="2800" i="1" dirty="0" smtClean="0"/>
-              <a:t>en estado invalido.</a:t>
-            </a:r>
-          </a:p>
-          <a:p>
-            <a:pPr>
-              <a:buNone/>
-            </a:pPr>
-            <a:r>
-              <a:rPr lang="es-AR" sz="2800" b="1" i="1" dirty="0" smtClean="0"/>
-              <a:t>Criterios de aceptación:</a:t>
-            </a:r>
-            <a:endParaRPr lang="es-AR" sz="2800" i="1" dirty="0" smtClean="0"/>
-          </a:p>
-          <a:p>
-            <a:pPr lvl="1"/>
-            <a:r>
-              <a:rPr lang="es-AR" i="1" dirty="0" smtClean="0"/>
-              <a:t>La aplicación valida al usuario.</a:t>
-            </a:r>
-          </a:p>
-          <a:p>
-            <a:pPr>
-              <a:buNone/>
-            </a:pPr>
-            <a:r>
-              <a:rPr lang="es-AR" sz="2800" b="1" i="1" dirty="0" smtClean="0"/>
-              <a:t>Pasos</a:t>
-            </a:r>
-            <a:r>
-              <a:rPr lang="es-AR" sz="2800" b="1" i="1" dirty="0" smtClean="0"/>
-              <a:t>:</a:t>
-            </a:r>
-            <a:endParaRPr lang="es-AR" sz="2800" i="1" dirty="0" smtClean="0"/>
-          </a:p>
-          <a:p>
-            <a:pPr marL="880110" lvl="1" indent="-514350">
-              <a:buFont typeface="+mj-lt"/>
-              <a:buAutoNum type="arabicPeriod"/>
-            </a:pPr>
-            <a:r>
-              <a:rPr lang="es-AR" i="1" dirty="0" smtClean="0"/>
-              <a:t>El </a:t>
-            </a:r>
-            <a:r>
-              <a:rPr lang="es-AR" i="1" dirty="0" smtClean="0"/>
-              <a:t>administrador inicia la sesión en la aplicación.</a:t>
-            </a:r>
-          </a:p>
-          <a:p>
-            <a:pPr marL="880110" lvl="1" indent="-514350">
-              <a:buFont typeface="+mj-lt"/>
-              <a:buAutoNum type="arabicPeriod"/>
-            </a:pPr>
-            <a:r>
-              <a:rPr lang="es-AR" i="1" dirty="0" smtClean="0"/>
-              <a:t>El </a:t>
-            </a:r>
-            <a:r>
-              <a:rPr lang="es-AR" i="1" dirty="0" smtClean="0"/>
-              <a:t>administrador presiona el botón de “Usuarios”</a:t>
-            </a:r>
-          </a:p>
-          <a:p>
-            <a:pPr marL="880110" lvl="1" indent="-514350">
-              <a:buFont typeface="+mj-lt"/>
-              <a:buAutoNum type="arabicPeriod"/>
-            </a:pPr>
-            <a:r>
-              <a:rPr lang="es-AR" i="1" dirty="0" smtClean="0"/>
-              <a:t>El </a:t>
-            </a:r>
-            <a:r>
-              <a:rPr lang="es-AR" i="1" dirty="0" smtClean="0"/>
-              <a:t>administrador presiona el botón de “Buscar”</a:t>
-            </a:r>
-          </a:p>
-          <a:p>
-            <a:pPr marL="1124712" lvl="2" indent="-457200">
-              <a:buFont typeface="+mj-lt"/>
-              <a:buAutoNum type="arabicPeriod"/>
-            </a:pPr>
-            <a:r>
-              <a:rPr lang="es-AR" i="1" dirty="0" smtClean="0"/>
-              <a:t>Opcionalmente </a:t>
-            </a:r>
-            <a:r>
-              <a:rPr lang="es-AR" i="1" dirty="0" smtClean="0"/>
-              <a:t>puede filtrar por el campo “D.N.I.”</a:t>
-            </a:r>
-          </a:p>
-          <a:p>
-            <a:pPr marL="880110" lvl="1" indent="-514350">
-              <a:buFont typeface="+mj-lt"/>
-              <a:buAutoNum type="arabicPeriod"/>
-            </a:pPr>
-            <a:r>
-              <a:rPr lang="es-AR" i="1" dirty="0" smtClean="0"/>
-              <a:t>La </a:t>
-            </a:r>
-            <a:r>
-              <a:rPr lang="es-AR" i="1" dirty="0" smtClean="0"/>
-              <a:t>aplicación muestra un listado de usuarios existentes.</a:t>
-            </a:r>
-          </a:p>
-          <a:p>
-            <a:pPr marL="880110" lvl="1" indent="-514350">
-              <a:buFont typeface="+mj-lt"/>
-              <a:buAutoNum type="arabicPeriod"/>
-            </a:pPr>
-            <a:r>
-              <a:rPr lang="es-AR" i="1" dirty="0" smtClean="0"/>
-              <a:t>El </a:t>
-            </a:r>
-            <a:r>
-              <a:rPr lang="es-AR" i="1" dirty="0" smtClean="0"/>
-              <a:t>administrador presiona el botón de “Validar”</a:t>
-            </a:r>
-          </a:p>
-          <a:p>
-            <a:pPr marL="880110" lvl="1" indent="-514350">
-              <a:buFont typeface="+mj-lt"/>
-              <a:buAutoNum type="arabicPeriod"/>
-            </a:pPr>
-            <a:r>
-              <a:rPr lang="es-AR" i="1" dirty="0" smtClean="0"/>
-              <a:t>La </a:t>
-            </a:r>
-            <a:r>
-              <a:rPr lang="es-AR" i="1" dirty="0" smtClean="0"/>
-              <a:t>aplicación muestra al usuario sin la característica de invalidado.</a:t>
-            </a:r>
-          </a:p>
-          <a:p>
-            <a:endParaRPr lang="es-AR" dirty="0" smtClean="0"/>
-          </a:p>
-          <a:p>
-            <a:endParaRPr lang="es-AR" dirty="0" smtClean="0"/>
-          </a:p>
-          <a:p>
-            <a:pPr>
-              <a:buNone/>
-            </a:pPr>
-            <a:endParaRPr lang="es-AR" dirty="0" smtClean="0"/>
-          </a:p>
-          <a:p>
-            <a:endParaRPr lang="es-AR" dirty="0" smtClean="0"/>
-          </a:p>
-          <a:p>
-            <a:endParaRPr lang="es-AR" dirty="0" smtClean="0"/>
-          </a:p>
-          <a:p>
-            <a:endParaRPr lang="es-AR" dirty="0"/>
-          </a:p>
-        </p:txBody>
-      </p:sp>
-      <p:sp>
-        <p:nvSpPr>
-          <p:cNvPr id="4" name="1 Título"/>
-          <p:cNvSpPr>
-            <a:spLocks noGrp="1"/>
-          </p:cNvSpPr>
-          <p:nvPr>
-            <p:ph type="title"/>
-          </p:nvPr>
-        </p:nvSpPr>
-        <p:spPr>
-          <a:xfrm>
-            <a:off x="457200" y="285728"/>
-            <a:ext cx="8229600" cy="1143000"/>
-          </a:xfrm>
-        </p:spPr>
-        <p:txBody>
-          <a:bodyPr/>
-          <a:lstStyle/>
-          <a:p>
-            <a:pPr algn="ctr"/>
-            <a:r>
-              <a:rPr lang="es-AR" dirty="0" smtClean="0"/>
-              <a:t>Sprint 1 – Pruebas Funcionales</a:t>
-            </a:r>
-            <a:endParaRPr lang="es-AR" dirty="0"/>
-          </a:p>
-        </p:txBody>
-      </p:sp>
-    </p:spTree>
-  </p:cSld>
-  <p:clrMapOvr>
-    <a:masterClrMapping/>
-  </p:clrMapOvr>
-</p:sld>
-</file>
-
-<file path=ppt/slides/slide17.xml><?xml version="1.0" encoding="utf-8"?>
-<p:sld xmlns:a="http://schemas.openxmlformats.org/drawingml/2006/main" xmlns:r="http://schemas.openxmlformats.org/officeDocument/2006/relationships" xmlns:p="http://schemas.openxmlformats.org/presentationml/2006/main">
-  <p:cSld>
-    <p:spTree>
-      <p:nvGrpSpPr>
-        <p:cNvPr id="1" name=""/>
-        <p:cNvGrpSpPr/>
-        <p:nvPr/>
-      </p:nvGrpSpPr>
-      <p:grpSpPr>
-        <a:xfrm>
-          <a:off x="0" y="0"/>
-          <a:ext cx="0" cy="0"/>
-          <a:chOff x="0" y="0"/>
-          <a:chExt cx="0" cy="0"/>
-        </a:xfrm>
-      </p:grpSpPr>
-      <p:sp>
-        <p:nvSpPr>
-          <p:cNvPr id="3" name="2 Marcador de contenido"/>
-          <p:cNvSpPr>
-            <a:spLocks noGrp="1"/>
-          </p:cNvSpPr>
-          <p:nvPr>
-            <p:ph idx="1"/>
-          </p:nvPr>
-        </p:nvSpPr>
-        <p:spPr>
-          <a:xfrm>
-            <a:off x="457200" y="1500174"/>
-            <a:ext cx="8229600" cy="5000660"/>
-          </a:xfrm>
-        </p:spPr>
-        <p:txBody>
-          <a:bodyPr>
-            <a:normAutofit fontScale="85000" lnSpcReduction="20000"/>
-          </a:bodyPr>
-          <a:lstStyle/>
-          <a:p>
-            <a:r>
-              <a:rPr lang="es-AR" dirty="0" smtClean="0"/>
-              <a:t>Se escribieron y corrieron pruebas funcionales para la </a:t>
-            </a:r>
-            <a:r>
-              <a:rPr lang="es-AR" dirty="0" smtClean="0"/>
-              <a:t>aplicación </a:t>
-            </a:r>
-            <a:r>
-              <a:rPr lang="es-AR" dirty="0" err="1" smtClean="0"/>
-              <a:t>Android</a:t>
-            </a:r>
-            <a:r>
-              <a:rPr lang="es-AR" dirty="0" smtClean="0"/>
-              <a:t>.</a:t>
-            </a:r>
-            <a:endParaRPr lang="es-AR" b="1" dirty="0" smtClean="0"/>
-          </a:p>
-          <a:p>
-            <a:pPr>
-              <a:buNone/>
-            </a:pPr>
-            <a:r>
-              <a:rPr lang="es-AR" sz="2800" b="1" i="1" dirty="0" smtClean="0"/>
-              <a:t>Prueba </a:t>
-            </a:r>
-            <a:r>
-              <a:rPr lang="es-AR" sz="2800" b="1" i="1" dirty="0" smtClean="0"/>
-              <a:t>1</a:t>
-            </a:r>
-          </a:p>
-          <a:p>
-            <a:pPr>
-              <a:buNone/>
-            </a:pPr>
-            <a:r>
-              <a:rPr lang="es-AR" sz="2800" i="1" dirty="0" smtClean="0"/>
-              <a:t>	El </a:t>
-            </a:r>
-            <a:r>
-              <a:rPr lang="es-AR" sz="2800" i="1" dirty="0" smtClean="0"/>
-              <a:t>usuario no tiene cuenta y desea ingresar sus datos para realizar una acción que requiera estar </a:t>
-            </a:r>
-            <a:r>
-              <a:rPr lang="es-AR" sz="2800" i="1" dirty="0" err="1" smtClean="0"/>
-              <a:t>logueado</a:t>
-            </a:r>
-            <a:r>
-              <a:rPr lang="es-AR" sz="2800" i="1" dirty="0" smtClean="0"/>
-              <a:t> o el usuario ingresa incorrectamente sus datos.</a:t>
-            </a:r>
-          </a:p>
-          <a:p>
-            <a:pPr>
-              <a:buNone/>
-            </a:pPr>
-            <a:r>
-              <a:rPr lang="es-AR" sz="2800" b="1" i="1" dirty="0" smtClean="0"/>
-              <a:t>Criterios de aceptación:</a:t>
-            </a:r>
-            <a:endParaRPr lang="es-AR" sz="2800" i="1" dirty="0" smtClean="0"/>
-          </a:p>
-          <a:p>
-            <a:pPr lvl="1"/>
-            <a:r>
-              <a:rPr lang="es-AR" i="1" dirty="0" smtClean="0"/>
-              <a:t>La </a:t>
-            </a:r>
-            <a:r>
-              <a:rPr lang="es-AR" i="1" dirty="0" smtClean="0"/>
-              <a:t>aplicación rechaza a usuarios inexistentes.</a:t>
-            </a:r>
-          </a:p>
-          <a:p>
-            <a:pPr>
-              <a:buNone/>
-            </a:pPr>
-            <a:r>
-              <a:rPr lang="es-AR" sz="2800" b="1" i="1" dirty="0" smtClean="0"/>
-              <a:t>Pasos:</a:t>
-            </a:r>
-            <a:endParaRPr lang="es-AR" sz="2800" i="1" dirty="0" smtClean="0"/>
-          </a:p>
-          <a:p>
-            <a:pPr marL="880110" lvl="1" indent="-514350">
-              <a:buFont typeface="+mj-lt"/>
-              <a:buAutoNum type="arabicPeriod"/>
-            </a:pPr>
-            <a:r>
-              <a:rPr lang="es-AR" i="1" dirty="0" smtClean="0"/>
-              <a:t>Usuario </a:t>
-            </a:r>
-            <a:r>
-              <a:rPr lang="es-AR" i="1" dirty="0" smtClean="0"/>
-              <a:t>ingresa por primera vez a la aplicación.</a:t>
-            </a:r>
-          </a:p>
-          <a:p>
-            <a:pPr marL="880110" lvl="1" indent="-514350">
-              <a:buFont typeface="+mj-lt"/>
-              <a:buAutoNum type="arabicPeriod"/>
-            </a:pPr>
-            <a:r>
-              <a:rPr lang="es-AR" i="1" dirty="0" smtClean="0"/>
-              <a:t>Usuario </a:t>
-            </a:r>
-            <a:r>
-              <a:rPr lang="es-AR" i="1" dirty="0" smtClean="0"/>
-              <a:t>utiliza la aplicación hasta que realiza una acción que </a:t>
-            </a:r>
-            <a:r>
-              <a:rPr lang="es-AR" i="1" dirty="0" smtClean="0"/>
-              <a:t>requiera </a:t>
-            </a:r>
-            <a:r>
-              <a:rPr lang="es-AR" i="1" dirty="0" smtClean="0"/>
-              <a:t>su usuario.</a:t>
-            </a:r>
-          </a:p>
-          <a:p>
-            <a:pPr marL="880110" lvl="1" indent="-514350">
-              <a:buFont typeface="+mj-lt"/>
-              <a:buAutoNum type="arabicPeriod"/>
-            </a:pPr>
-            <a:r>
-              <a:rPr lang="es-AR" i="1" dirty="0" smtClean="0"/>
-              <a:t>La </a:t>
-            </a:r>
-            <a:r>
-              <a:rPr lang="es-AR" i="1" dirty="0" smtClean="0"/>
-              <a:t>aplicación le muestra la pantalla de </a:t>
-            </a:r>
-            <a:r>
-              <a:rPr lang="es-AR" i="1" dirty="0" err="1" smtClean="0"/>
-              <a:t>Login</a:t>
-            </a:r>
-            <a:r>
-              <a:rPr lang="es-AR" i="1" dirty="0" smtClean="0"/>
-              <a:t> y el usuario ingresa </a:t>
-            </a:r>
-            <a:r>
-              <a:rPr lang="es-AR" i="1" dirty="0" smtClean="0"/>
-              <a:t>datos </a:t>
-            </a:r>
-            <a:r>
-              <a:rPr lang="es-AR" i="1" dirty="0" smtClean="0"/>
-              <a:t>incorrectos para ingresar a la aplicación.</a:t>
-            </a:r>
-          </a:p>
-          <a:p>
-            <a:pPr marL="880110" lvl="1" indent="-514350">
-              <a:buFont typeface="+mj-lt"/>
-              <a:buAutoNum type="arabicPeriod"/>
-            </a:pPr>
-            <a:r>
-              <a:rPr lang="es-AR" i="1" dirty="0" smtClean="0"/>
-              <a:t>La </a:t>
-            </a:r>
-            <a:r>
-              <a:rPr lang="es-AR" i="1" dirty="0" smtClean="0"/>
-              <a:t>aplicación lanza un mensaje de error de credenciales </a:t>
-            </a:r>
-            <a:r>
-              <a:rPr lang="es-AR" i="1" dirty="0" smtClean="0"/>
-              <a:t>	desconocidas.</a:t>
-            </a:r>
-            <a:endParaRPr lang="es-AR" i="1" dirty="0" smtClean="0"/>
-          </a:p>
-        </p:txBody>
-      </p:sp>
-      <p:sp>
-        <p:nvSpPr>
-          <p:cNvPr id="4" name="1 Título"/>
-          <p:cNvSpPr>
-            <a:spLocks noGrp="1"/>
-          </p:cNvSpPr>
-          <p:nvPr>
-            <p:ph type="title"/>
-          </p:nvPr>
-        </p:nvSpPr>
-        <p:spPr>
-          <a:xfrm>
-            <a:off x="457200" y="285728"/>
-            <a:ext cx="8229600" cy="1143000"/>
-          </a:xfrm>
-        </p:spPr>
-        <p:txBody>
-          <a:bodyPr/>
-          <a:lstStyle/>
-          <a:p>
-            <a:pPr algn="ctr"/>
-            <a:r>
-              <a:rPr lang="es-AR" dirty="0" smtClean="0"/>
-              <a:t>Sprint 1 – Pruebas Funcionales</a:t>
-            </a:r>
-            <a:endParaRPr lang="es-AR" dirty="0"/>
-          </a:p>
-        </p:txBody>
-      </p:sp>
-    </p:spTree>
-  </p:cSld>
-  <p:clrMapOvr>
-    <a:masterClrMapping/>
-  </p:clrMapOvr>
-</p:sld>
-</file>
-
-<file path=ppt/slides/slide18.xml><?xml version="1.0" encoding="utf-8"?>
-<p:sld xmlns:a="http://schemas.openxmlformats.org/drawingml/2006/main" xmlns:r="http://schemas.openxmlformats.org/officeDocument/2006/relationships" xmlns:p="http://schemas.openxmlformats.org/presentationml/2006/main">
-  <p:cSld>
-    <p:spTree>
-      <p:nvGrpSpPr>
-        <p:cNvPr id="1" name=""/>
-        <p:cNvGrpSpPr/>
-        <p:nvPr/>
-      </p:nvGrpSpPr>
-      <p:grpSpPr>
-        <a:xfrm>
-          <a:off x="0" y="0"/>
-          <a:ext cx="0" cy="0"/>
-          <a:chOff x="0" y="0"/>
-          <a:chExt cx="0" cy="0"/>
-        </a:xfrm>
-      </p:grpSpPr>
-      <p:sp>
-        <p:nvSpPr>
-          <p:cNvPr id="3" name="2 Marcador de contenido"/>
-          <p:cNvSpPr>
-            <a:spLocks noGrp="1"/>
-          </p:cNvSpPr>
-          <p:nvPr>
-            <p:ph idx="1"/>
-          </p:nvPr>
-        </p:nvSpPr>
-        <p:spPr>
-          <a:xfrm>
-            <a:off x="457200" y="1357298"/>
-            <a:ext cx="8229600" cy="5500702"/>
-          </a:xfrm>
-        </p:spPr>
-        <p:txBody>
-          <a:bodyPr>
-            <a:normAutofit/>
-          </a:bodyPr>
-          <a:lstStyle/>
-          <a:p>
-            <a:pPr>
-              <a:buNone/>
-            </a:pPr>
-            <a:r>
-              <a:rPr lang="es-AR" sz="1600" b="1" i="1" dirty="0" smtClean="0"/>
-              <a:t>Prueba 2</a:t>
-            </a:r>
-          </a:p>
-          <a:p>
-            <a:pPr>
-              <a:buNone/>
-            </a:pPr>
-            <a:r>
-              <a:rPr lang="es-AR" sz="1600" i="1" dirty="0" smtClean="0"/>
-              <a:t>	El </a:t>
-            </a:r>
-            <a:r>
-              <a:rPr lang="es-AR" sz="1600" i="1" dirty="0" smtClean="0"/>
-              <a:t>usuario no tiene cuenta y desea crear una cuenta.</a:t>
-            </a:r>
-          </a:p>
-          <a:p>
-            <a:pPr>
-              <a:buNone/>
-            </a:pPr>
-            <a:r>
-              <a:rPr lang="es-AR" sz="1600" b="1" i="1" dirty="0" smtClean="0"/>
-              <a:t>Criterios de aceptación:</a:t>
-            </a:r>
-            <a:endParaRPr lang="es-AR" sz="1600" i="1" dirty="0" smtClean="0"/>
-          </a:p>
-          <a:p>
-            <a:pPr lvl="1"/>
-            <a:r>
-              <a:rPr lang="es-AR" sz="1600" i="1" dirty="0" smtClean="0"/>
-              <a:t>La </a:t>
-            </a:r>
-            <a:r>
-              <a:rPr lang="es-AR" sz="1600" i="1" dirty="0" smtClean="0"/>
-              <a:t>aplicación debe enviar a la pantalla de </a:t>
-            </a:r>
-            <a:r>
-              <a:rPr lang="es-AR" sz="1600" i="1" dirty="0" err="1" smtClean="0"/>
-              <a:t>Login</a:t>
-            </a:r>
-            <a:r>
-              <a:rPr lang="es-AR" sz="1600" i="1" dirty="0" smtClean="0"/>
-              <a:t> a los usuarios que no están </a:t>
-            </a:r>
-            <a:r>
-              <a:rPr lang="es-AR" sz="1600" i="1" dirty="0" err="1" smtClean="0"/>
-              <a:t>logueados</a:t>
-            </a:r>
-            <a:r>
-              <a:rPr lang="es-AR" sz="1600" i="1" dirty="0" smtClean="0"/>
-              <a:t> </a:t>
-            </a:r>
-            <a:r>
-              <a:rPr lang="es-AR" sz="1600" i="1" dirty="0" smtClean="0"/>
-              <a:t>y </a:t>
-            </a:r>
-            <a:r>
-              <a:rPr lang="es-AR" sz="1600" i="1" dirty="0" smtClean="0"/>
-              <a:t>que realizan </a:t>
-            </a:r>
-            <a:r>
-              <a:rPr lang="es-AR" sz="1600" i="1" dirty="0" smtClean="0"/>
-              <a:t>operaciones donde se requiera estarlo.</a:t>
-            </a:r>
-          </a:p>
-          <a:p>
-            <a:pPr lvl="1"/>
-            <a:r>
-              <a:rPr lang="es-AR" sz="1600" i="1" dirty="0" smtClean="0"/>
-              <a:t>La </a:t>
-            </a:r>
-            <a:r>
-              <a:rPr lang="es-AR" sz="1600" i="1" dirty="0" smtClean="0"/>
-              <a:t>aplicación muestra un mensaje de envío de e-mail de confirmación a un  </a:t>
-            </a:r>
-            <a:r>
-              <a:rPr lang="es-AR" sz="1600" i="1" dirty="0" smtClean="0"/>
-              <a:t>usuario </a:t>
-            </a:r>
-            <a:r>
-              <a:rPr lang="es-AR" sz="1600" i="1" dirty="0" smtClean="0"/>
-              <a:t>que se </a:t>
-            </a:r>
-            <a:r>
-              <a:rPr lang="es-AR" sz="1600" i="1" dirty="0" smtClean="0"/>
-              <a:t>registra (con </a:t>
-            </a:r>
-            <a:r>
-              <a:rPr lang="es-AR" sz="1600" i="1" dirty="0" smtClean="0"/>
-              <a:t>datos validos en los campos requeridos).</a:t>
-            </a:r>
-          </a:p>
-          <a:p>
-            <a:pPr>
-              <a:buNone/>
-            </a:pPr>
-            <a:r>
-              <a:rPr lang="es-AR" sz="1600" b="1" i="1" dirty="0" smtClean="0"/>
-              <a:t>Pasos:</a:t>
-            </a:r>
-            <a:endParaRPr lang="es-AR" sz="1600" i="1" dirty="0" smtClean="0"/>
-          </a:p>
-          <a:p>
-            <a:pPr marL="880110" lvl="1" indent="-514350">
-              <a:buFont typeface="+mj-lt"/>
-              <a:buAutoNum type="arabicPeriod"/>
-            </a:pPr>
-            <a:r>
-              <a:rPr lang="es-AR" sz="1600" i="1" dirty="0" smtClean="0"/>
-              <a:t>Usuario </a:t>
-            </a:r>
-            <a:r>
-              <a:rPr lang="es-AR" sz="1600" i="1" dirty="0" smtClean="0"/>
-              <a:t>ingresa por primera vez a la aplicación.</a:t>
-            </a:r>
-          </a:p>
-          <a:p>
-            <a:pPr marL="880110" lvl="1" indent="-514350">
-              <a:buFont typeface="+mj-lt"/>
-              <a:buAutoNum type="arabicPeriod"/>
-            </a:pPr>
-            <a:r>
-              <a:rPr lang="es-AR" sz="1600" i="1" dirty="0" smtClean="0"/>
-              <a:t>Usuario </a:t>
-            </a:r>
-            <a:r>
-              <a:rPr lang="es-AR" sz="1600" i="1" dirty="0" smtClean="0"/>
-              <a:t>utiliza la aplicación hasta que realiza una acción que requiera su </a:t>
-            </a:r>
-            <a:r>
-              <a:rPr lang="es-AR" sz="1600" i="1" dirty="0" smtClean="0"/>
-              <a:t>usuario</a:t>
-            </a:r>
-            <a:r>
-              <a:rPr lang="es-AR" sz="1600" i="1" dirty="0" smtClean="0"/>
-              <a:t>.</a:t>
-            </a:r>
-          </a:p>
-          <a:p>
-            <a:pPr marL="880110" lvl="1" indent="-514350">
-              <a:buFont typeface="+mj-lt"/>
-              <a:buAutoNum type="arabicPeriod"/>
-            </a:pPr>
-            <a:r>
-              <a:rPr lang="es-AR" sz="1600" i="1" dirty="0" smtClean="0"/>
-              <a:t>La </a:t>
-            </a:r>
-            <a:r>
-              <a:rPr lang="es-AR" sz="1600" i="1" dirty="0" smtClean="0"/>
-              <a:t>aplicación le muestra la pantalla de </a:t>
-            </a:r>
-            <a:r>
-              <a:rPr lang="es-AR" sz="1600" i="1" dirty="0" err="1" smtClean="0"/>
-              <a:t>Login</a:t>
-            </a:r>
-            <a:r>
-              <a:rPr lang="es-AR" sz="1600" i="1" dirty="0" smtClean="0"/>
-              <a:t>.</a:t>
-            </a:r>
-          </a:p>
-          <a:p>
-            <a:pPr marL="880110" lvl="1" indent="-514350">
-              <a:buFont typeface="+mj-lt"/>
-              <a:buAutoNum type="arabicPeriod"/>
-            </a:pPr>
-            <a:r>
-              <a:rPr lang="es-AR" sz="1600" i="1" dirty="0" smtClean="0"/>
-              <a:t>El </a:t>
-            </a:r>
-            <a:r>
-              <a:rPr lang="es-AR" sz="1600" i="1" dirty="0" smtClean="0"/>
-              <a:t>usuario toca el botón “Registrarse”.</a:t>
-            </a:r>
-          </a:p>
-          <a:p>
-            <a:pPr marL="880110" lvl="1" indent="-514350">
-              <a:buFont typeface="+mj-lt"/>
-              <a:buAutoNum type="arabicPeriod"/>
-            </a:pPr>
-            <a:r>
-              <a:rPr lang="es-AR" sz="1600" i="1" dirty="0" smtClean="0"/>
-              <a:t>La </a:t>
-            </a:r>
-            <a:r>
-              <a:rPr lang="es-AR" sz="1600" i="1" dirty="0" smtClean="0"/>
-              <a:t>aplicación le muestra la ventana de Registro.</a:t>
-            </a:r>
-          </a:p>
-          <a:p>
-            <a:pPr marL="880110" lvl="1" indent="-514350">
-              <a:buFont typeface="+mj-lt"/>
-              <a:buAutoNum type="arabicPeriod"/>
-            </a:pPr>
-            <a:r>
-              <a:rPr lang="es-AR" sz="1600" i="1" dirty="0" smtClean="0"/>
-              <a:t>El </a:t>
-            </a:r>
-            <a:r>
-              <a:rPr lang="es-AR" sz="1600" i="1" dirty="0" smtClean="0"/>
-              <a:t>usuario llena los campos obligatorios y no obligatorios de forma correcta.</a:t>
-            </a:r>
-          </a:p>
-          <a:p>
-            <a:pPr marL="880110" lvl="1" indent="-514350">
-              <a:buFont typeface="+mj-lt"/>
-              <a:buAutoNum type="arabicPeriod"/>
-            </a:pPr>
-            <a:r>
-              <a:rPr lang="es-AR" sz="1600" i="1" dirty="0" smtClean="0"/>
-              <a:t>El </a:t>
-            </a:r>
-            <a:r>
-              <a:rPr lang="es-AR" sz="1600" i="1" dirty="0" smtClean="0"/>
-              <a:t>usuario toca el botón “Registrarse”.</a:t>
-            </a:r>
-          </a:p>
-          <a:p>
-            <a:pPr marL="880110" lvl="1" indent="-514350">
-              <a:buFont typeface="+mj-lt"/>
-              <a:buAutoNum type="arabicPeriod"/>
-            </a:pPr>
-            <a:r>
-              <a:rPr lang="es-AR" sz="1600" i="1" dirty="0" smtClean="0"/>
-              <a:t>La </a:t>
-            </a:r>
-            <a:r>
-              <a:rPr lang="es-AR" sz="1600" i="1" dirty="0" smtClean="0"/>
-              <a:t>aplicación le informa mediante un mensaje de dialogo que recibirá un </a:t>
-            </a:r>
-            <a:r>
-              <a:rPr lang="es-AR" sz="1600" i="1" dirty="0" smtClean="0"/>
-              <a:t>e-mail </a:t>
-            </a:r>
-            <a:r>
-              <a:rPr lang="es-AR" sz="1600" i="1" dirty="0" smtClean="0"/>
-              <a:t>de confirmación</a:t>
-            </a:r>
-            <a:r>
-              <a:rPr lang="es-AR" sz="1600" i="1" dirty="0" smtClean="0"/>
-              <a:t>.</a:t>
-            </a:r>
-            <a:endParaRPr lang="es-AR" sz="1600" i="1" dirty="0" smtClean="0"/>
-          </a:p>
-        </p:txBody>
-      </p:sp>
-      <p:sp>
-        <p:nvSpPr>
-          <p:cNvPr id="4" name="1 Título"/>
-          <p:cNvSpPr>
-            <a:spLocks noGrp="1"/>
-          </p:cNvSpPr>
-          <p:nvPr>
-            <p:ph type="title"/>
-          </p:nvPr>
-        </p:nvSpPr>
-        <p:spPr>
-          <a:xfrm>
-            <a:off x="457200" y="285728"/>
-            <a:ext cx="8229600" cy="1143000"/>
-          </a:xfrm>
-        </p:spPr>
-        <p:txBody>
-          <a:bodyPr/>
-          <a:lstStyle/>
-          <a:p>
-            <a:pPr algn="ctr"/>
-            <a:r>
-              <a:rPr lang="es-AR" dirty="0" smtClean="0"/>
-              <a:t>Sprint 1 – Pruebas Funcionales</a:t>
-            </a:r>
-            <a:endParaRPr lang="es-AR" dirty="0"/>
-          </a:p>
-        </p:txBody>
-      </p:sp>
-    </p:spTree>
-  </p:cSld>
-  <p:clrMapOvr>
-    <a:masterClrMapping/>
-  </p:clrMapOvr>
-</p:sld>
-</file>
-
-<file path=ppt/slides/slide19.xml><?xml version="1.0" encoding="utf-8"?>
-<p:sld xmlns:a="http://schemas.openxmlformats.org/drawingml/2006/main" xmlns:r="http://schemas.openxmlformats.org/officeDocument/2006/relationships" xmlns:p="http://schemas.openxmlformats.org/presentationml/2006/main">
-  <p:cSld>
-    <p:spTree>
-      <p:nvGrpSpPr>
-        <p:cNvPr id="1" name=""/>
-        <p:cNvGrpSpPr/>
-        <p:nvPr/>
-      </p:nvGrpSpPr>
-      <p:grpSpPr>
-        <a:xfrm>
-          <a:off x="0" y="0"/>
-          <a:ext cx="0" cy="0"/>
-          <a:chOff x="0" y="0"/>
-          <a:chExt cx="0" cy="0"/>
-        </a:xfrm>
-      </p:grpSpPr>
-      <p:sp>
-        <p:nvSpPr>
-          <p:cNvPr id="3" name="2 Marcador de contenido"/>
-          <p:cNvSpPr>
-            <a:spLocks noGrp="1"/>
-          </p:cNvSpPr>
-          <p:nvPr>
-            <p:ph idx="1"/>
-          </p:nvPr>
-        </p:nvSpPr>
-        <p:spPr>
-          <a:xfrm>
-            <a:off x="457200" y="1571612"/>
-            <a:ext cx="8229600" cy="4389120"/>
-          </a:xfrm>
-        </p:spPr>
-        <p:txBody>
-          <a:bodyPr>
-            <a:normAutofit fontScale="85000" lnSpcReduction="10000"/>
-          </a:bodyPr>
-          <a:lstStyle/>
-          <a:p>
-            <a:pPr>
-              <a:buNone/>
-            </a:pPr>
-            <a:r>
-              <a:rPr lang="es-AR" sz="2800" b="1" i="1" dirty="0" smtClean="0"/>
-              <a:t>Prueba 3</a:t>
-            </a:r>
-          </a:p>
-          <a:p>
-            <a:pPr>
-              <a:buNone/>
-            </a:pPr>
-            <a:r>
-              <a:rPr lang="es-AR" sz="2800" i="1" dirty="0" smtClean="0"/>
-              <a:t>	El </a:t>
-            </a:r>
-            <a:r>
-              <a:rPr lang="es-AR" sz="2800" i="1" dirty="0" smtClean="0"/>
-              <a:t>usuario creó una cuenta y desea </a:t>
-            </a:r>
-            <a:r>
-              <a:rPr lang="es-AR" sz="2800" i="1" dirty="0" err="1" smtClean="0"/>
-              <a:t>loguearse</a:t>
-            </a:r>
-            <a:r>
-              <a:rPr lang="es-AR" sz="2800" i="1" dirty="0" smtClean="0"/>
-              <a:t>. La cuenta no está </a:t>
-            </a:r>
-            <a:r>
-              <a:rPr lang="es-AR" sz="2800" i="1" dirty="0" smtClean="0"/>
-              <a:t>	confirmada</a:t>
-            </a:r>
-            <a:r>
-              <a:rPr lang="es-AR" sz="2800" i="1" dirty="0" smtClean="0"/>
-              <a:t>.</a:t>
-            </a:r>
-          </a:p>
-          <a:p>
-            <a:pPr>
-              <a:buNone/>
-            </a:pPr>
-            <a:r>
-              <a:rPr lang="es-AR" sz="2800" b="1" i="1" dirty="0" smtClean="0"/>
-              <a:t>Criterios de aceptación:</a:t>
-            </a:r>
-            <a:endParaRPr lang="es-AR" sz="2800" i="1" dirty="0" smtClean="0"/>
-          </a:p>
-          <a:p>
-            <a:pPr lvl="1"/>
-            <a:r>
-              <a:rPr lang="es-AR" i="1" dirty="0" smtClean="0"/>
-              <a:t>La </a:t>
-            </a:r>
-            <a:r>
-              <a:rPr lang="es-AR" i="1" dirty="0" smtClean="0"/>
-              <a:t>aplicación rechaza a usuarios que no han confirmado su cuenta.</a:t>
-            </a:r>
-          </a:p>
-          <a:p>
-            <a:pPr>
-              <a:buNone/>
-            </a:pPr>
-            <a:r>
-              <a:rPr lang="es-AR" sz="2800" b="1" i="1" dirty="0" smtClean="0"/>
-              <a:t>Pasos:</a:t>
-            </a:r>
-            <a:endParaRPr lang="es-AR" sz="2800" i="1" dirty="0" smtClean="0"/>
-          </a:p>
-          <a:p>
-            <a:pPr marL="880110" lvl="1" indent="-514350">
-              <a:buFont typeface="+mj-lt"/>
-              <a:buAutoNum type="arabicPeriod"/>
-            </a:pPr>
-            <a:r>
-              <a:rPr lang="es-AR" i="1" dirty="0" smtClean="0"/>
-              <a:t>Usuario ingresa por primera vez a la aplicación.</a:t>
-            </a:r>
-          </a:p>
-          <a:p>
-            <a:pPr marL="880110" lvl="1" indent="-514350">
-              <a:buFont typeface="+mj-lt"/>
-              <a:buAutoNum type="arabicPeriod"/>
-            </a:pPr>
-            <a:r>
-              <a:rPr lang="es-AR" i="1" dirty="0" smtClean="0"/>
-              <a:t>Usuario utiliza la aplicación hasta que realiza una acción que requiera su usuario.</a:t>
-            </a:r>
-          </a:p>
-          <a:p>
-            <a:pPr marL="880110" lvl="1" indent="-514350">
-              <a:buFont typeface="+mj-lt"/>
-              <a:buAutoNum type="arabicPeriod"/>
-            </a:pPr>
-            <a:r>
-              <a:rPr lang="es-AR" i="1" dirty="0" smtClean="0"/>
-              <a:t>La aplicación le muestra la pantalla de </a:t>
-            </a:r>
-            <a:r>
-              <a:rPr lang="es-AR" i="1" dirty="0" err="1" smtClean="0"/>
-              <a:t>Login</a:t>
-            </a:r>
-            <a:r>
-              <a:rPr lang="es-AR" i="1" dirty="0" smtClean="0"/>
-              <a:t>.</a:t>
-            </a:r>
-          </a:p>
-          <a:p>
-            <a:pPr marL="880110" lvl="1" indent="-514350">
-              <a:buFont typeface="+mj-lt"/>
-              <a:buAutoNum type="arabicPeriod"/>
-            </a:pPr>
-            <a:r>
-              <a:rPr lang="es-AR" i="1" dirty="0" smtClean="0"/>
-              <a:t>El usuario ingresa sus datos en los campos de e-mail y </a:t>
-            </a:r>
-            <a:r>
-              <a:rPr lang="es-AR" i="1" dirty="0" err="1" smtClean="0"/>
-              <a:t>password</a:t>
-            </a:r>
-            <a:r>
-              <a:rPr lang="es-AR" i="1" dirty="0" smtClean="0"/>
-              <a:t>.</a:t>
-            </a:r>
-          </a:p>
-          <a:p>
-            <a:pPr marL="880110" lvl="1" indent="-514350">
-              <a:buFont typeface="+mj-lt"/>
-              <a:buAutoNum type="arabicPeriod"/>
-            </a:pPr>
-            <a:r>
-              <a:rPr lang="es-AR" i="1" dirty="0" smtClean="0"/>
-              <a:t>La aplicación le muestra un mensaje de credenciales inválidas</a:t>
-            </a:r>
-            <a:r>
-              <a:rPr lang="es-AR" i="1" dirty="0" smtClean="0"/>
-              <a:t>.</a:t>
-            </a:r>
-            <a:endParaRPr lang="es-AR" i="1" dirty="0" smtClean="0"/>
-          </a:p>
-        </p:txBody>
-      </p:sp>
-      <p:sp>
-        <p:nvSpPr>
-          <p:cNvPr id="4" name="1 Título"/>
-          <p:cNvSpPr>
-            <a:spLocks noGrp="1"/>
-          </p:cNvSpPr>
-          <p:nvPr>
-            <p:ph type="title"/>
-          </p:nvPr>
-        </p:nvSpPr>
-        <p:spPr>
-          <a:xfrm>
-            <a:off x="457200" y="285728"/>
-            <a:ext cx="8229600" cy="1143000"/>
-          </a:xfrm>
-        </p:spPr>
-        <p:txBody>
-          <a:bodyPr/>
-          <a:lstStyle/>
-          <a:p>
-            <a:pPr algn="ctr"/>
-            <a:r>
-              <a:rPr lang="es-AR" dirty="0" smtClean="0"/>
-              <a:t>Sprint 1 – Pruebas Funcionales</a:t>
-            </a:r>
-            <a:endParaRPr lang="es-AR" dirty="0"/>
-          </a:p>
-        </p:txBody>
-      </p:sp>
+      <p:pic>
+        <p:nvPicPr>
+          <p:cNvPr id="4" name="3 Imagen" descr="images.jpg"/>
+          <p:cNvPicPr>
+            <a:picLocks noChangeAspect="1"/>
+          </p:cNvPicPr>
+          <p:nvPr/>
+        </p:nvPicPr>
+        <p:blipFill>
+          <a:blip r:embed="rId2"/>
+          <a:stretch>
+            <a:fillRect/>
+          </a:stretch>
+        </p:blipFill>
+        <p:spPr>
+          <a:xfrm>
+            <a:off x="922508" y="1928802"/>
+            <a:ext cx="7007078" cy="4024335"/>
+          </a:xfrm>
+          <a:prstGeom prst="rect">
+            <a:avLst/>
+          </a:prstGeom>
+        </p:spPr>
+      </p:pic>
     </p:spTree>
   </p:cSld>
   <p:clrMapOvr>
@@ -6375,1229 +4736,6 @@
           </a:p>
         </p:txBody>
       </p:sp>
-    </p:spTree>
-  </p:cSld>
-  <p:clrMapOvr>
-    <a:masterClrMapping/>
-  </p:clrMapOvr>
-</p:sld>
-</file>
-
-<file path=ppt/slides/slide20.xml><?xml version="1.0" encoding="utf-8"?>
-<p:sld xmlns:a="http://schemas.openxmlformats.org/drawingml/2006/main" xmlns:r="http://schemas.openxmlformats.org/officeDocument/2006/relationships" xmlns:p="http://schemas.openxmlformats.org/presentationml/2006/main">
-  <p:cSld>
-    <p:spTree>
-      <p:nvGrpSpPr>
-        <p:cNvPr id="1" name=""/>
-        <p:cNvGrpSpPr/>
-        <p:nvPr/>
-      </p:nvGrpSpPr>
-      <p:grpSpPr>
-        <a:xfrm>
-          <a:off x="0" y="0"/>
-          <a:ext cx="0" cy="0"/>
-          <a:chOff x="0" y="0"/>
-          <a:chExt cx="0" cy="0"/>
-        </a:xfrm>
-      </p:grpSpPr>
-      <p:sp>
-        <p:nvSpPr>
-          <p:cNvPr id="3" name="2 Marcador de contenido"/>
-          <p:cNvSpPr>
-            <a:spLocks noGrp="1"/>
-          </p:cNvSpPr>
-          <p:nvPr>
-            <p:ph idx="1"/>
-          </p:nvPr>
-        </p:nvSpPr>
-        <p:spPr>
-          <a:xfrm>
-            <a:off x="500034" y="1500174"/>
-            <a:ext cx="8229600" cy="5072098"/>
-          </a:xfrm>
-        </p:spPr>
-        <p:txBody>
-          <a:bodyPr>
-            <a:normAutofit fontScale="85000" lnSpcReduction="20000"/>
-          </a:bodyPr>
-          <a:lstStyle/>
-          <a:p>
-            <a:pPr>
-              <a:buNone/>
-            </a:pPr>
-            <a:r>
-              <a:rPr lang="es-AR" sz="2800" b="1" i="1" dirty="0" smtClean="0"/>
-              <a:t>Prueba 4</a:t>
-            </a:r>
-          </a:p>
-          <a:p>
-            <a:pPr>
-              <a:buNone/>
-            </a:pPr>
-            <a:r>
-              <a:rPr lang="es-AR" sz="2800" i="1" dirty="0" smtClean="0"/>
-              <a:t>	El </a:t>
-            </a:r>
-            <a:r>
-              <a:rPr lang="es-AR" sz="2800" i="1" dirty="0" smtClean="0"/>
-              <a:t>usuario creó una cuenta y la confirmo desde su casilla de e-mail.</a:t>
-            </a:r>
-          </a:p>
-          <a:p>
-            <a:pPr>
-              <a:buNone/>
-            </a:pPr>
-            <a:r>
-              <a:rPr lang="es-AR" sz="2800" b="1" i="1" dirty="0" smtClean="0"/>
-              <a:t>Criterios de aceptación:</a:t>
-            </a:r>
-            <a:endParaRPr lang="es-AR" sz="2800" i="1" dirty="0" smtClean="0"/>
-          </a:p>
-          <a:p>
-            <a:pPr lvl="1"/>
-            <a:r>
-              <a:rPr lang="es-AR" i="1" dirty="0" smtClean="0"/>
-              <a:t>La </a:t>
-            </a:r>
-            <a:r>
-              <a:rPr lang="es-AR" i="1" dirty="0" smtClean="0"/>
-              <a:t>aplicación acepta usuarios existentes y confirmados.</a:t>
-            </a:r>
-          </a:p>
-          <a:p>
-            <a:pPr lvl="1"/>
-            <a:r>
-              <a:rPr lang="es-AR" i="1" dirty="0" smtClean="0"/>
-              <a:t>La </a:t>
-            </a:r>
-            <a:r>
-              <a:rPr lang="es-AR" i="1" dirty="0" smtClean="0"/>
-              <a:t>aplicación </a:t>
-            </a:r>
-            <a:r>
-              <a:rPr lang="es-AR" i="1" dirty="0" err="1" smtClean="0"/>
-              <a:t>redirecciona</a:t>
-            </a:r>
-            <a:r>
-              <a:rPr lang="es-AR" i="1" dirty="0" smtClean="0"/>
-              <a:t> al usuario a la ventana con la acción que </a:t>
-            </a:r>
-            <a:r>
-              <a:rPr lang="es-AR" i="1" dirty="0" smtClean="0"/>
-              <a:t>	requirió </a:t>
-            </a:r>
-            <a:r>
-              <a:rPr lang="es-AR" i="1" dirty="0" smtClean="0"/>
-              <a:t>el </a:t>
-            </a:r>
-            <a:r>
-              <a:rPr lang="es-AR" i="1" dirty="0" err="1" smtClean="0"/>
-              <a:t>logueo</a:t>
-            </a:r>
-            <a:r>
-              <a:rPr lang="es-AR" i="1" dirty="0" smtClean="0"/>
-              <a:t>.</a:t>
-            </a:r>
-          </a:p>
-          <a:p>
-            <a:pPr>
-              <a:buNone/>
-            </a:pPr>
-            <a:r>
-              <a:rPr lang="es-AR" sz="2800" b="1" i="1" dirty="0" smtClean="0"/>
-              <a:t>Pasos:</a:t>
-            </a:r>
-            <a:endParaRPr lang="es-AR" sz="2800" i="1" dirty="0" smtClean="0"/>
-          </a:p>
-          <a:p>
-            <a:pPr marL="880110" lvl="1" indent="-514350">
-              <a:buFont typeface="+mj-lt"/>
-              <a:buAutoNum type="arabicPeriod"/>
-            </a:pPr>
-            <a:r>
-              <a:rPr lang="es-AR" i="1" dirty="0" smtClean="0"/>
-              <a:t>El usuario ingresa por primera vez a la aplicación.</a:t>
-            </a:r>
-          </a:p>
-          <a:p>
-            <a:pPr marL="880110" lvl="1" indent="-514350">
-              <a:buFont typeface="+mj-lt"/>
-              <a:buAutoNum type="arabicPeriod"/>
-            </a:pPr>
-            <a:r>
-              <a:rPr lang="es-AR" i="1" dirty="0" smtClean="0"/>
-              <a:t>El usuario utiliza la aplicación hasta que realiza una acción que requiera su usuario.</a:t>
-            </a:r>
-          </a:p>
-          <a:p>
-            <a:pPr marL="880110" lvl="1" indent="-514350">
-              <a:buFont typeface="+mj-lt"/>
-              <a:buAutoNum type="arabicPeriod"/>
-            </a:pPr>
-            <a:r>
-              <a:rPr lang="es-AR" i="1" dirty="0" smtClean="0"/>
-              <a:t>La aplicación le muestra la pantalla de </a:t>
-            </a:r>
-            <a:r>
-              <a:rPr lang="es-AR" i="1" dirty="0" err="1" smtClean="0"/>
-              <a:t>Login</a:t>
-            </a:r>
-            <a:r>
-              <a:rPr lang="es-AR" i="1" dirty="0" smtClean="0"/>
-              <a:t>.</a:t>
-            </a:r>
-          </a:p>
-          <a:p>
-            <a:pPr marL="880110" lvl="1" indent="-514350">
-              <a:buFont typeface="+mj-lt"/>
-              <a:buAutoNum type="arabicPeriod"/>
-            </a:pPr>
-            <a:r>
-              <a:rPr lang="es-AR" i="1" dirty="0" smtClean="0"/>
-              <a:t>El usuario ingresa las credenciales y toca el botón “ingresar”.</a:t>
-            </a:r>
-          </a:p>
-          <a:p>
-            <a:pPr marL="880110" lvl="1" indent="-514350">
-              <a:buFont typeface="+mj-lt"/>
-              <a:buAutoNum type="arabicPeriod"/>
-            </a:pPr>
-            <a:r>
-              <a:rPr lang="es-AR" i="1" dirty="0" smtClean="0"/>
-              <a:t>La aplicación lo lleva a la ventana donde se había requerido la acción que disparo el procesos de </a:t>
-            </a:r>
-            <a:r>
-              <a:rPr lang="es-AR" i="1" dirty="0" err="1" smtClean="0"/>
-              <a:t>logueo</a:t>
-            </a:r>
-            <a:r>
-              <a:rPr lang="es-AR" i="1" dirty="0" smtClean="0"/>
-              <a:t>.</a:t>
-            </a:r>
-            <a:endParaRPr lang="es-AR" i="1" dirty="0" smtClean="0"/>
-          </a:p>
-        </p:txBody>
-      </p:sp>
-      <p:sp>
-        <p:nvSpPr>
-          <p:cNvPr id="4" name="1 Título"/>
-          <p:cNvSpPr>
-            <a:spLocks noGrp="1"/>
-          </p:cNvSpPr>
-          <p:nvPr>
-            <p:ph type="title"/>
-          </p:nvPr>
-        </p:nvSpPr>
-        <p:spPr>
-          <a:xfrm>
-            <a:off x="457200" y="285728"/>
-            <a:ext cx="8229600" cy="1143000"/>
-          </a:xfrm>
-        </p:spPr>
-        <p:txBody>
-          <a:bodyPr/>
-          <a:lstStyle/>
-          <a:p>
-            <a:pPr algn="ctr"/>
-            <a:r>
-              <a:rPr lang="es-AR" dirty="0" smtClean="0"/>
-              <a:t>Sprint 1 – Pruebas Funcionales</a:t>
-            </a:r>
-            <a:endParaRPr lang="es-AR" dirty="0"/>
-          </a:p>
-        </p:txBody>
-      </p:sp>
-    </p:spTree>
-  </p:cSld>
-  <p:clrMapOvr>
-    <a:masterClrMapping/>
-  </p:clrMapOvr>
-</p:sld>
-</file>
-
-<file path=ppt/slides/slide21.xml><?xml version="1.0" encoding="utf-8"?>
-<p:sld xmlns:a="http://schemas.openxmlformats.org/drawingml/2006/main" xmlns:r="http://schemas.openxmlformats.org/officeDocument/2006/relationships" xmlns:p="http://schemas.openxmlformats.org/presentationml/2006/main">
-  <p:cSld>
-    <p:spTree>
-      <p:nvGrpSpPr>
-        <p:cNvPr id="1" name=""/>
-        <p:cNvGrpSpPr/>
-        <p:nvPr/>
-      </p:nvGrpSpPr>
-      <p:grpSpPr>
-        <a:xfrm>
-          <a:off x="0" y="0"/>
-          <a:ext cx="0" cy="0"/>
-          <a:chOff x="0" y="0"/>
-          <a:chExt cx="0" cy="0"/>
-        </a:xfrm>
-      </p:grpSpPr>
-      <p:sp>
-        <p:nvSpPr>
-          <p:cNvPr id="3" name="2 Marcador de contenido"/>
-          <p:cNvSpPr>
-            <a:spLocks noGrp="1"/>
-          </p:cNvSpPr>
-          <p:nvPr>
-            <p:ph idx="1"/>
-          </p:nvPr>
-        </p:nvSpPr>
-        <p:spPr>
-          <a:xfrm>
-            <a:off x="428596" y="1428736"/>
-            <a:ext cx="8229600" cy="5214974"/>
-          </a:xfrm>
-        </p:spPr>
-        <p:txBody>
-          <a:bodyPr>
-            <a:normAutofit fontScale="92500"/>
-          </a:bodyPr>
-          <a:lstStyle/>
-          <a:p>
-            <a:pPr>
-              <a:buNone/>
-            </a:pPr>
-            <a:r>
-              <a:rPr lang="es-AR" sz="2800" b="1" i="1" dirty="0" smtClean="0"/>
-              <a:t>Paso 5</a:t>
-            </a:r>
-          </a:p>
-          <a:p>
-            <a:pPr>
-              <a:buNone/>
-            </a:pPr>
-            <a:r>
-              <a:rPr lang="es-AR" sz="2800" i="1" dirty="0" smtClean="0"/>
-              <a:t>El usuario esta registrado y se </a:t>
-            </a:r>
-            <a:r>
-              <a:rPr lang="es-AR" sz="2800" i="1" dirty="0" err="1" smtClean="0"/>
-              <a:t>logueo</a:t>
-            </a:r>
-            <a:r>
-              <a:rPr lang="es-AR" sz="2800" i="1" dirty="0" smtClean="0"/>
-              <a:t> en la aplicación. La aplicación es lanzada desde </a:t>
-            </a:r>
-            <a:r>
-              <a:rPr lang="es-AR" sz="2800" i="1" dirty="0" err="1" smtClean="0"/>
-              <a:t>background</a:t>
-            </a:r>
-            <a:r>
-              <a:rPr lang="es-AR" sz="2800" i="1" dirty="0" smtClean="0"/>
-              <a:t>. El usuario desea realizar una acción que pide </a:t>
-            </a:r>
-            <a:r>
-              <a:rPr lang="es-AR" sz="2800" i="1" dirty="0" err="1" smtClean="0"/>
-              <a:t>logueo</a:t>
-            </a:r>
-            <a:r>
-              <a:rPr lang="es-AR" sz="2800" i="1" dirty="0" smtClean="0"/>
-              <a:t>.</a:t>
-            </a:r>
-          </a:p>
-          <a:p>
-            <a:pPr>
-              <a:buNone/>
-            </a:pPr>
-            <a:r>
-              <a:rPr lang="es-AR" sz="2800" b="1" i="1" dirty="0" smtClean="0"/>
-              <a:t>Criterios de aceptación:</a:t>
-            </a:r>
-            <a:endParaRPr lang="es-AR" sz="2800" i="1" dirty="0" smtClean="0"/>
-          </a:p>
-          <a:p>
-            <a:pPr lvl="1"/>
-            <a:r>
-              <a:rPr lang="es-AR" i="1" dirty="0" smtClean="0"/>
-              <a:t>La aplicación no le pide </a:t>
-            </a:r>
-            <a:r>
-              <a:rPr lang="es-AR" i="1" dirty="0" err="1" smtClean="0"/>
-              <a:t>loguearse</a:t>
-            </a:r>
-            <a:r>
-              <a:rPr lang="es-AR" i="1" dirty="0" smtClean="0"/>
-              <a:t> al realizar la acción.</a:t>
-            </a:r>
-          </a:p>
-          <a:p>
-            <a:pPr>
-              <a:buNone/>
-            </a:pPr>
-            <a:r>
-              <a:rPr lang="es-AR" sz="2800" b="1" i="1" dirty="0" smtClean="0"/>
-              <a:t>Pasos:</a:t>
-            </a:r>
-            <a:endParaRPr lang="es-AR" sz="2800" i="1" dirty="0" smtClean="0"/>
-          </a:p>
-          <a:p>
-            <a:pPr marL="880110" lvl="1" indent="-514350">
-              <a:buFont typeface="+mj-lt"/>
-              <a:buAutoNum type="arabicPeriod"/>
-            </a:pPr>
-            <a:r>
-              <a:rPr lang="es-AR" i="1" dirty="0" smtClean="0"/>
-              <a:t>El usuario ingresa a la aplicación.</a:t>
-            </a:r>
-          </a:p>
-          <a:p>
-            <a:pPr marL="880110" lvl="1" indent="-514350">
-              <a:buFont typeface="+mj-lt"/>
-              <a:buAutoNum type="arabicPeriod"/>
-            </a:pPr>
-            <a:r>
-              <a:rPr lang="es-AR" i="1" dirty="0" smtClean="0"/>
-              <a:t>El usuario utiliza la aplicación hasta que realiza una acción que requiera su usuario.</a:t>
-            </a:r>
-          </a:p>
-          <a:p>
-            <a:pPr marL="880110" lvl="1" indent="-514350">
-              <a:buFont typeface="+mj-lt"/>
-              <a:buAutoNum type="arabicPeriod"/>
-            </a:pPr>
-            <a:r>
-              <a:rPr lang="es-AR" i="1" dirty="0" smtClean="0"/>
-              <a:t>La aplicación le permite continuar con la acción sin abrir la ventana de </a:t>
-            </a:r>
-            <a:r>
-              <a:rPr lang="es-AR" i="1" dirty="0" err="1" smtClean="0"/>
-              <a:t>logueo</a:t>
-            </a:r>
-            <a:r>
-              <a:rPr lang="es-AR" i="1" dirty="0" smtClean="0"/>
-              <a:t>.</a:t>
-            </a:r>
-            <a:endParaRPr lang="es-AR" i="1" dirty="0" smtClean="0"/>
-          </a:p>
-        </p:txBody>
-      </p:sp>
-      <p:sp>
-        <p:nvSpPr>
-          <p:cNvPr id="4" name="1 Título"/>
-          <p:cNvSpPr>
-            <a:spLocks noGrp="1"/>
-          </p:cNvSpPr>
-          <p:nvPr>
-            <p:ph type="title"/>
-          </p:nvPr>
-        </p:nvSpPr>
-        <p:spPr>
-          <a:xfrm>
-            <a:off x="457200" y="285728"/>
-            <a:ext cx="8229600" cy="1143000"/>
-          </a:xfrm>
-        </p:spPr>
-        <p:txBody>
-          <a:bodyPr/>
-          <a:lstStyle/>
-          <a:p>
-            <a:pPr algn="ctr"/>
-            <a:r>
-              <a:rPr lang="es-AR" dirty="0" smtClean="0"/>
-              <a:t>Sprint 1 – Pruebas Funcionales</a:t>
-            </a:r>
-            <a:endParaRPr lang="es-AR" dirty="0"/>
-          </a:p>
-        </p:txBody>
-      </p:sp>
-    </p:spTree>
-  </p:cSld>
-  <p:clrMapOvr>
-    <a:masterClrMapping/>
-  </p:clrMapOvr>
-</p:sld>
-</file>
-
-<file path=ppt/slides/slide22.xml><?xml version="1.0" encoding="utf-8"?>
-<p:sld xmlns:a="http://schemas.openxmlformats.org/drawingml/2006/main" xmlns:r="http://schemas.openxmlformats.org/officeDocument/2006/relationships" xmlns:p="http://schemas.openxmlformats.org/presentationml/2006/main">
-  <p:cSld>
-    <p:spTree>
-      <p:nvGrpSpPr>
-        <p:cNvPr id="1" name=""/>
-        <p:cNvGrpSpPr/>
-        <p:nvPr/>
-      </p:nvGrpSpPr>
-      <p:grpSpPr>
-        <a:xfrm>
-          <a:off x="0" y="0"/>
-          <a:ext cx="0" cy="0"/>
-          <a:chOff x="0" y="0"/>
-          <a:chExt cx="0" cy="0"/>
-        </a:xfrm>
-      </p:grpSpPr>
-      <p:sp>
-        <p:nvSpPr>
-          <p:cNvPr id="3" name="2 Marcador de contenido"/>
-          <p:cNvSpPr>
-            <a:spLocks noGrp="1"/>
-          </p:cNvSpPr>
-          <p:nvPr>
-            <p:ph idx="1"/>
-          </p:nvPr>
-        </p:nvSpPr>
-        <p:spPr>
-          <a:xfrm>
-            <a:off x="500034" y="1500174"/>
-            <a:ext cx="8229600" cy="5143536"/>
-          </a:xfrm>
-        </p:spPr>
-        <p:txBody>
-          <a:bodyPr>
-            <a:normAutofit fontScale="70000" lnSpcReduction="20000"/>
-          </a:bodyPr>
-          <a:lstStyle/>
-          <a:p>
-            <a:pPr>
-              <a:buNone/>
-            </a:pPr>
-            <a:r>
-              <a:rPr lang="es-AR" sz="2800" b="1" i="1" dirty="0" smtClean="0"/>
-              <a:t>Prueba 6</a:t>
-            </a:r>
-            <a:endParaRPr lang="es-AR" sz="2800" b="1" i="1" dirty="0" smtClean="0"/>
-          </a:p>
-          <a:p>
-            <a:pPr>
-              <a:buNone/>
-            </a:pPr>
-            <a:r>
-              <a:rPr lang="es-AR" sz="2800" i="1" dirty="0" smtClean="0"/>
-              <a:t>El usuario desea registrarse pero los campos que ingresan son inválidos (no cumplen con el formato o no ingresa los campos obligatorios).</a:t>
-            </a:r>
-          </a:p>
-          <a:p>
-            <a:pPr>
-              <a:buNone/>
-            </a:pPr>
-            <a:r>
-              <a:rPr lang="es-AR" sz="2800" b="1" i="1" dirty="0" smtClean="0"/>
-              <a:t>Criterios de aceptación:</a:t>
-            </a:r>
-            <a:endParaRPr lang="es-AR" sz="2800" i="1" dirty="0" smtClean="0"/>
-          </a:p>
-          <a:p>
-            <a:pPr lvl="1"/>
-            <a:r>
-              <a:rPr lang="es-AR" i="1" dirty="0" smtClean="0"/>
-              <a:t>La aplicación informa al usuario los campos erróneos para que sean corregidos.</a:t>
-            </a:r>
-          </a:p>
-          <a:p>
-            <a:pPr lvl="1"/>
-            <a:r>
-              <a:rPr lang="es-AR" i="1" dirty="0" smtClean="0"/>
-              <a:t>La aplicación no le muestra el mensaje de confirmación de cuenta.</a:t>
-            </a:r>
-          </a:p>
-          <a:p>
-            <a:pPr lvl="1"/>
-            <a:r>
-              <a:rPr lang="es-AR" i="1" dirty="0" smtClean="0"/>
-              <a:t>No se crea la cuenta.</a:t>
-            </a:r>
-          </a:p>
-          <a:p>
-            <a:pPr>
-              <a:buNone/>
-            </a:pPr>
-            <a:r>
-              <a:rPr lang="es-AR" sz="2800" b="1" i="1" dirty="0" smtClean="0"/>
-              <a:t>Pasos</a:t>
-            </a:r>
-            <a:r>
-              <a:rPr lang="es-AR" sz="2800" b="1" i="1" dirty="0" smtClean="0"/>
-              <a:t>:</a:t>
-            </a:r>
-            <a:endParaRPr lang="es-AR" sz="2800" i="1" dirty="0" smtClean="0"/>
-          </a:p>
-          <a:p>
-            <a:pPr marL="880110" lvl="1" indent="-514350">
-              <a:buFont typeface="+mj-lt"/>
-              <a:buAutoNum type="arabicPeriod"/>
-            </a:pPr>
-            <a:r>
-              <a:rPr lang="es-AR" i="1" dirty="0" smtClean="0"/>
-              <a:t>El usuario ingresa a la ventana de Registro.</a:t>
-            </a:r>
-          </a:p>
-          <a:p>
-            <a:pPr marL="880110" lvl="1" indent="-514350">
-              <a:buFont typeface="+mj-lt"/>
-              <a:buAutoNum type="arabicPeriod"/>
-            </a:pPr>
-            <a:r>
-              <a:rPr lang="es-AR" i="1" dirty="0" smtClean="0"/>
-              <a:t>El usuario ingresa datos de manera invalida:</a:t>
-            </a:r>
-          </a:p>
-          <a:p>
-            <a:pPr marL="1124712" lvl="2" indent="-457200">
-              <a:buFont typeface="+mj-lt"/>
-              <a:buAutoNum type="arabicPeriod"/>
-            </a:pPr>
-            <a:r>
-              <a:rPr lang="es-AR" i="1" dirty="0" smtClean="0"/>
-              <a:t>No completa los campos marcados como obligatorios.</a:t>
-            </a:r>
-          </a:p>
-          <a:p>
-            <a:pPr marL="1124712" lvl="2" indent="-457200">
-              <a:buFont typeface="+mj-lt"/>
-              <a:buAutoNum type="arabicPeriod"/>
-            </a:pPr>
-            <a:r>
-              <a:rPr lang="es-AR" i="1" dirty="0" smtClean="0"/>
-              <a:t>La contraseña y la confirmación de contraseña no coinciden.</a:t>
-            </a:r>
-          </a:p>
-          <a:p>
-            <a:pPr marL="1124712" lvl="2" indent="-457200">
-              <a:buFont typeface="+mj-lt"/>
-              <a:buAutoNum type="arabicPeriod"/>
-            </a:pPr>
-            <a:r>
-              <a:rPr lang="es-AR" i="1" dirty="0" smtClean="0"/>
-              <a:t>No utiliza los formatos correctos de cada campo.</a:t>
-            </a:r>
-          </a:p>
-          <a:p>
-            <a:pPr marL="880110" lvl="1" indent="-514350">
-              <a:buFont typeface="+mj-lt"/>
-              <a:buAutoNum type="arabicPeriod"/>
-            </a:pPr>
-            <a:r>
-              <a:rPr lang="es-AR" i="1" dirty="0" smtClean="0"/>
-              <a:t>El usuario toca el botón “registrarse”.</a:t>
-            </a:r>
-          </a:p>
-          <a:p>
-            <a:pPr marL="880110" lvl="1" indent="-514350">
-              <a:buFont typeface="+mj-lt"/>
-              <a:buAutoNum type="arabicPeriod"/>
-            </a:pPr>
-            <a:r>
-              <a:rPr lang="es-AR" i="1" dirty="0" smtClean="0"/>
-              <a:t>La aplicación:</a:t>
-            </a:r>
-          </a:p>
-          <a:p>
-            <a:pPr marL="1124712" lvl="2" indent="-457200">
-              <a:buFont typeface="+mj-lt"/>
-              <a:buAutoNum type="arabicPeriod"/>
-            </a:pPr>
-            <a:r>
-              <a:rPr lang="es-AR" i="1" dirty="0" smtClean="0"/>
-              <a:t>Marca los campos obligatorios que están vacíos, e informa que deben ser completados. </a:t>
-            </a:r>
-          </a:p>
-          <a:p>
-            <a:pPr marL="1124712" lvl="2" indent="-457200">
-              <a:buFont typeface="+mj-lt"/>
-              <a:buAutoNum type="arabicPeriod"/>
-            </a:pPr>
-            <a:r>
-              <a:rPr lang="es-AR" i="1" dirty="0" smtClean="0"/>
-              <a:t>Marca el campo contraseña y confirmación de contraseña, indica que no coinciden y que deben ser completados nuevamente.</a:t>
-            </a:r>
-          </a:p>
-          <a:p>
-            <a:pPr marL="1124712" lvl="2" indent="-457200">
-              <a:buFont typeface="+mj-lt"/>
-              <a:buAutoNum type="arabicPeriod"/>
-            </a:pPr>
-            <a:r>
-              <a:rPr lang="es-AR" i="1" dirty="0" smtClean="0"/>
-              <a:t>Marca los campos cuyo formato fue incorrecto, e informa el formato correcto</a:t>
-            </a:r>
-            <a:r>
-              <a:rPr lang="es-AR" i="1" dirty="0" smtClean="0"/>
-              <a:t>.</a:t>
-            </a:r>
-            <a:endParaRPr lang="es-AR" i="1" dirty="0" smtClean="0"/>
-          </a:p>
-        </p:txBody>
-      </p:sp>
-      <p:sp>
-        <p:nvSpPr>
-          <p:cNvPr id="4" name="1 Título"/>
-          <p:cNvSpPr>
-            <a:spLocks noGrp="1"/>
-          </p:cNvSpPr>
-          <p:nvPr>
-            <p:ph type="title"/>
-          </p:nvPr>
-        </p:nvSpPr>
-        <p:spPr>
-          <a:xfrm>
-            <a:off x="457200" y="285728"/>
-            <a:ext cx="8229600" cy="1143000"/>
-          </a:xfrm>
-        </p:spPr>
-        <p:txBody>
-          <a:bodyPr/>
-          <a:lstStyle/>
-          <a:p>
-            <a:pPr algn="ctr"/>
-            <a:r>
-              <a:rPr lang="es-AR" dirty="0" smtClean="0"/>
-              <a:t>Sprint 1 – Pruebas Funcionales</a:t>
-            </a:r>
-            <a:endParaRPr lang="es-AR" dirty="0"/>
-          </a:p>
-        </p:txBody>
-      </p:sp>
-    </p:spTree>
-  </p:cSld>
-  <p:clrMapOvr>
-    <a:masterClrMapping/>
-  </p:clrMapOvr>
-</p:sld>
-</file>
-
-<file path=ppt/slides/slide23.xml><?xml version="1.0" encoding="utf-8"?>
-<p:sld xmlns:a="http://schemas.openxmlformats.org/drawingml/2006/main" xmlns:r="http://schemas.openxmlformats.org/officeDocument/2006/relationships" xmlns:p="http://schemas.openxmlformats.org/presentationml/2006/main">
-  <p:cSld>
-    <p:spTree>
-      <p:nvGrpSpPr>
-        <p:cNvPr id="1" name=""/>
-        <p:cNvGrpSpPr/>
-        <p:nvPr/>
-      </p:nvGrpSpPr>
-      <p:grpSpPr>
-        <a:xfrm>
-          <a:off x="0" y="0"/>
-          <a:ext cx="0" cy="0"/>
-          <a:chOff x="0" y="0"/>
-          <a:chExt cx="0" cy="0"/>
-        </a:xfrm>
-      </p:grpSpPr>
-      <p:sp>
-        <p:nvSpPr>
-          <p:cNvPr id="3" name="2 Marcador de contenido"/>
-          <p:cNvSpPr>
-            <a:spLocks noGrp="1"/>
-          </p:cNvSpPr>
-          <p:nvPr>
-            <p:ph idx="1"/>
-          </p:nvPr>
-        </p:nvSpPr>
-        <p:spPr>
-          <a:xfrm>
-            <a:off x="500034" y="1500174"/>
-            <a:ext cx="8229600" cy="5072098"/>
-          </a:xfrm>
-        </p:spPr>
-        <p:txBody>
-          <a:bodyPr>
-            <a:normAutofit lnSpcReduction="10000"/>
-          </a:bodyPr>
-          <a:lstStyle/>
-          <a:p>
-            <a:pPr>
-              <a:buNone/>
-            </a:pPr>
-            <a:r>
-              <a:rPr lang="es-AR" sz="2400" b="1" i="1" dirty="0" smtClean="0"/>
-              <a:t>Prueba 7</a:t>
-            </a:r>
-            <a:endParaRPr lang="es-AR" sz="2400" b="1" i="1" dirty="0" smtClean="0"/>
-          </a:p>
-          <a:p>
-            <a:pPr>
-              <a:buNone/>
-            </a:pPr>
-            <a:r>
-              <a:rPr lang="es-AR" sz="2400" i="1" dirty="0" smtClean="0"/>
-              <a:t>El usuario desea registrarse pero el DNI esta en uso por otra cuenta.</a:t>
-            </a:r>
-          </a:p>
-          <a:p>
-            <a:pPr>
-              <a:buNone/>
-            </a:pPr>
-            <a:r>
-              <a:rPr lang="es-AR" sz="2400" b="1" i="1" dirty="0" smtClean="0"/>
-              <a:t>Criterios de aceptación:</a:t>
-            </a:r>
-            <a:endParaRPr lang="es-AR" sz="2400" i="1" dirty="0" smtClean="0"/>
-          </a:p>
-          <a:p>
-            <a:pPr lvl="1"/>
-            <a:r>
-              <a:rPr lang="es-AR" sz="2200" i="1" dirty="0" smtClean="0"/>
-              <a:t>La aplicación le muestra el mensaje de DNI en uso.</a:t>
-            </a:r>
-          </a:p>
-          <a:p>
-            <a:pPr lvl="1"/>
-            <a:r>
-              <a:rPr lang="es-AR" sz="2200" i="1" dirty="0" smtClean="0"/>
-              <a:t>No se crea la cuenta.</a:t>
-            </a:r>
-          </a:p>
-          <a:p>
-            <a:pPr>
-              <a:buNone/>
-            </a:pPr>
-            <a:r>
-              <a:rPr lang="es-AR" sz="2400" b="1" i="1" dirty="0" smtClean="0"/>
-              <a:t>Pasos:</a:t>
-            </a:r>
-            <a:endParaRPr lang="es-AR" sz="2400" i="1" dirty="0" smtClean="0"/>
-          </a:p>
-          <a:p>
-            <a:pPr marL="822960" lvl="1" indent="-457200">
-              <a:buFont typeface="+mj-lt"/>
-              <a:buAutoNum type="arabicPeriod"/>
-            </a:pPr>
-            <a:r>
-              <a:rPr lang="es-AR" sz="2200" i="1" dirty="0" smtClean="0"/>
-              <a:t>El usuario ingresa a la ventana de Registro.</a:t>
-            </a:r>
-          </a:p>
-          <a:p>
-            <a:pPr marL="822960" lvl="1" indent="-457200">
-              <a:buFont typeface="+mj-lt"/>
-              <a:buAutoNum type="arabicPeriod"/>
-            </a:pPr>
-            <a:r>
-              <a:rPr lang="es-AR" sz="2200" i="1" dirty="0" smtClean="0"/>
-              <a:t>El usuario ingresa de forma correcta todos los datos, con la excepción de que el DNI que ingresa ya existe en el sistema.</a:t>
-            </a:r>
-          </a:p>
-          <a:p>
-            <a:pPr marL="822960" lvl="1" indent="-457200">
-              <a:buFont typeface="+mj-lt"/>
-              <a:buAutoNum type="arabicPeriod"/>
-            </a:pPr>
-            <a:r>
-              <a:rPr lang="es-AR" sz="2200" i="1" dirty="0" smtClean="0"/>
-              <a:t>El usuario toca el botón “registrarse”.</a:t>
-            </a:r>
-          </a:p>
-          <a:p>
-            <a:pPr marL="822960" lvl="1" indent="-457200">
-              <a:buFont typeface="+mj-lt"/>
-              <a:buAutoNum type="arabicPeriod"/>
-            </a:pPr>
-            <a:r>
-              <a:rPr lang="es-AR" sz="2200" i="1" dirty="0" smtClean="0"/>
-              <a:t>La aplicación informa mediante un mensaje que el DNI esta en uso por otra cuenta</a:t>
-            </a:r>
-            <a:r>
-              <a:rPr lang="es-AR" sz="2200" i="1" dirty="0" smtClean="0"/>
-              <a:t>.</a:t>
-            </a:r>
-            <a:endParaRPr lang="es-AR" sz="2200" i="1" dirty="0" smtClean="0"/>
-          </a:p>
-        </p:txBody>
-      </p:sp>
-      <p:sp>
-        <p:nvSpPr>
-          <p:cNvPr id="4" name="1 Título"/>
-          <p:cNvSpPr>
-            <a:spLocks noGrp="1"/>
-          </p:cNvSpPr>
-          <p:nvPr>
-            <p:ph type="title"/>
-          </p:nvPr>
-        </p:nvSpPr>
-        <p:spPr>
-          <a:xfrm>
-            <a:off x="457200" y="285728"/>
-            <a:ext cx="8229600" cy="1143000"/>
-          </a:xfrm>
-        </p:spPr>
-        <p:txBody>
-          <a:bodyPr/>
-          <a:lstStyle/>
-          <a:p>
-            <a:pPr algn="ctr"/>
-            <a:r>
-              <a:rPr lang="es-AR" dirty="0" smtClean="0"/>
-              <a:t>Sprint 1 – Pruebas Funcionales</a:t>
-            </a:r>
-            <a:endParaRPr lang="es-AR" dirty="0"/>
-          </a:p>
-        </p:txBody>
-      </p:sp>
-    </p:spTree>
-  </p:cSld>
-  <p:clrMapOvr>
-    <a:masterClrMapping/>
-  </p:clrMapOvr>
-</p:sld>
-</file>
-
-<file path=ppt/slides/slide24.xml><?xml version="1.0" encoding="utf-8"?>
-<p:sld xmlns:a="http://schemas.openxmlformats.org/drawingml/2006/main" xmlns:r="http://schemas.openxmlformats.org/officeDocument/2006/relationships" xmlns:p="http://schemas.openxmlformats.org/presentationml/2006/main">
-  <p:cSld>
-    <p:spTree>
-      <p:nvGrpSpPr>
-        <p:cNvPr id="1" name=""/>
-        <p:cNvGrpSpPr/>
-        <p:nvPr/>
-      </p:nvGrpSpPr>
-      <p:grpSpPr>
-        <a:xfrm>
-          <a:off x="0" y="0"/>
-          <a:ext cx="0" cy="0"/>
-          <a:chOff x="0" y="0"/>
-          <a:chExt cx="0" cy="0"/>
-        </a:xfrm>
-      </p:grpSpPr>
-      <p:sp>
-        <p:nvSpPr>
-          <p:cNvPr id="3" name="2 Marcador de contenido"/>
-          <p:cNvSpPr>
-            <a:spLocks noGrp="1"/>
-          </p:cNvSpPr>
-          <p:nvPr>
-            <p:ph idx="1"/>
-          </p:nvPr>
-        </p:nvSpPr>
-        <p:spPr>
-          <a:xfrm>
-            <a:off x="428596" y="1500174"/>
-            <a:ext cx="8229600" cy="5000660"/>
-          </a:xfrm>
-        </p:spPr>
-        <p:txBody>
-          <a:bodyPr>
-            <a:normAutofit fontScale="92500" lnSpcReduction="20000"/>
-          </a:bodyPr>
-          <a:lstStyle/>
-          <a:p>
-            <a:pPr>
-              <a:buNone/>
-            </a:pPr>
-            <a:r>
-              <a:rPr lang="es-AR" sz="2800" b="1" i="1" dirty="0" smtClean="0"/>
-              <a:t>Prueba 8</a:t>
-            </a:r>
-            <a:endParaRPr lang="es-AR" sz="2800" b="1" i="1" dirty="0" smtClean="0"/>
-          </a:p>
-          <a:p>
-            <a:pPr>
-              <a:buNone/>
-            </a:pPr>
-            <a:r>
-              <a:rPr lang="es-AR" sz="2800" i="1" dirty="0" smtClean="0"/>
-              <a:t>El usuario desea registrarse pero el e-mail ya posee una cuenta en la aplicación.</a:t>
-            </a:r>
-          </a:p>
-          <a:p>
-            <a:pPr>
-              <a:buNone/>
-            </a:pPr>
-            <a:r>
-              <a:rPr lang="es-AR" sz="2800" b="1" i="1" dirty="0" smtClean="0"/>
-              <a:t>Criterios de aceptación:</a:t>
-            </a:r>
-            <a:endParaRPr lang="es-AR" sz="2800" i="1" dirty="0" smtClean="0"/>
-          </a:p>
-          <a:p>
-            <a:pPr lvl="1"/>
-            <a:r>
-              <a:rPr lang="es-AR" i="1" dirty="0" smtClean="0"/>
-              <a:t>La aplicación le muestra el mensaje de e-mail ya utilizado.</a:t>
-            </a:r>
-          </a:p>
-          <a:p>
-            <a:pPr lvl="1"/>
-            <a:r>
-              <a:rPr lang="es-AR" i="1" dirty="0" smtClean="0"/>
-              <a:t>No se crea la cuenta.</a:t>
-            </a:r>
-          </a:p>
-          <a:p>
-            <a:pPr>
-              <a:buNone/>
-            </a:pPr>
-            <a:r>
-              <a:rPr lang="es-AR" sz="2800" b="1" i="1" dirty="0" smtClean="0"/>
-              <a:t>Pasos:</a:t>
-            </a:r>
-            <a:endParaRPr lang="es-AR" sz="2800" i="1" dirty="0" smtClean="0"/>
-          </a:p>
-          <a:p>
-            <a:pPr marL="880110" lvl="1" indent="-514350">
-              <a:buFont typeface="+mj-lt"/>
-              <a:buAutoNum type="arabicPeriod"/>
-            </a:pPr>
-            <a:r>
-              <a:rPr lang="es-AR" i="1" dirty="0" smtClean="0"/>
-              <a:t>El usuario ingresa a la ventana de Registro.</a:t>
-            </a:r>
-          </a:p>
-          <a:p>
-            <a:pPr marL="880110" lvl="1" indent="-514350">
-              <a:buFont typeface="+mj-lt"/>
-              <a:buAutoNum type="arabicPeriod"/>
-            </a:pPr>
-            <a:r>
-              <a:rPr lang="es-AR" i="1" dirty="0" smtClean="0"/>
-              <a:t>El usuario ingresa de forma correcta todos los datos, con la excepción de que el e-mail que ingresa ya existe en el sistema.</a:t>
-            </a:r>
-          </a:p>
-          <a:p>
-            <a:pPr marL="880110" lvl="1" indent="-514350">
-              <a:buFont typeface="+mj-lt"/>
-              <a:buAutoNum type="arabicPeriod"/>
-            </a:pPr>
-            <a:r>
-              <a:rPr lang="es-AR" i="1" dirty="0" smtClean="0"/>
-              <a:t>El usuario toca el botón “registrarse”.</a:t>
-            </a:r>
-          </a:p>
-          <a:p>
-            <a:pPr marL="880110" lvl="1" indent="-514350">
-              <a:buFont typeface="+mj-lt"/>
-              <a:buAutoNum type="arabicPeriod"/>
-            </a:pPr>
-            <a:r>
-              <a:rPr lang="es-AR" i="1" dirty="0" smtClean="0"/>
-              <a:t>La aplicación informa mediante un mensaje que el e-mail ya posee una cuenta.</a:t>
-            </a:r>
-          </a:p>
-          <a:p>
-            <a:pPr>
-              <a:buNone/>
-            </a:pPr>
-            <a:endParaRPr lang="es-AR" dirty="0" smtClean="0"/>
-          </a:p>
-          <a:p>
-            <a:pPr>
-              <a:buNone/>
-            </a:pPr>
-            <a:endParaRPr lang="es-AR" dirty="0" smtClean="0"/>
-          </a:p>
-          <a:p>
-            <a:endParaRPr lang="es-AR" dirty="0" smtClean="0"/>
-          </a:p>
-          <a:p>
-            <a:endParaRPr lang="es-AR" dirty="0" smtClean="0"/>
-          </a:p>
-          <a:p>
-            <a:endParaRPr lang="es-AR" dirty="0" smtClean="0"/>
-          </a:p>
-          <a:p>
-            <a:endParaRPr lang="es-AR" dirty="0" smtClean="0"/>
-          </a:p>
-          <a:p>
-            <a:endParaRPr lang="es-AR" dirty="0" smtClean="0"/>
-          </a:p>
-          <a:p>
-            <a:endParaRPr lang="es-AR" dirty="0"/>
-          </a:p>
-        </p:txBody>
-      </p:sp>
-      <p:sp>
-        <p:nvSpPr>
-          <p:cNvPr id="4" name="1 Título"/>
-          <p:cNvSpPr>
-            <a:spLocks noGrp="1"/>
-          </p:cNvSpPr>
-          <p:nvPr>
-            <p:ph type="title"/>
-          </p:nvPr>
-        </p:nvSpPr>
-        <p:spPr>
-          <a:xfrm>
-            <a:off x="457200" y="285728"/>
-            <a:ext cx="8229600" cy="1143000"/>
-          </a:xfrm>
-        </p:spPr>
-        <p:txBody>
-          <a:bodyPr/>
-          <a:lstStyle/>
-          <a:p>
-            <a:pPr algn="ctr"/>
-            <a:r>
-              <a:rPr lang="es-AR" dirty="0" smtClean="0"/>
-              <a:t>Sprint 1 – Pruebas Funcionales</a:t>
-            </a:r>
-            <a:endParaRPr lang="es-AR" dirty="0"/>
-          </a:p>
-        </p:txBody>
-      </p:sp>
-    </p:spTree>
-  </p:cSld>
-  <p:clrMapOvr>
-    <a:masterClrMapping/>
-  </p:clrMapOvr>
-</p:sld>
-</file>
-
-<file path=ppt/slides/slide25.xml><?xml version="1.0" encoding="utf-8"?>
-<p:sld xmlns:a="http://schemas.openxmlformats.org/drawingml/2006/main" xmlns:r="http://schemas.openxmlformats.org/officeDocument/2006/relationships" xmlns:p="http://schemas.openxmlformats.org/presentationml/2006/main">
-  <p:cSld>
-    <p:spTree>
-      <p:nvGrpSpPr>
-        <p:cNvPr id="1" name=""/>
-        <p:cNvGrpSpPr/>
-        <p:nvPr/>
-      </p:nvGrpSpPr>
-      <p:grpSpPr>
-        <a:xfrm>
-          <a:off x="0" y="0"/>
-          <a:ext cx="0" cy="0"/>
-          <a:chOff x="0" y="0"/>
-          <a:chExt cx="0" cy="0"/>
-        </a:xfrm>
-      </p:grpSpPr>
-      <p:sp>
-        <p:nvSpPr>
-          <p:cNvPr id="2" name="1 Título"/>
-          <p:cNvSpPr>
-            <a:spLocks noGrp="1"/>
-          </p:cNvSpPr>
-          <p:nvPr>
-            <p:ph type="title"/>
-          </p:nvPr>
-        </p:nvSpPr>
-        <p:spPr>
-          <a:xfrm>
-            <a:off x="457200" y="357166"/>
-            <a:ext cx="8229600" cy="1143000"/>
-          </a:xfrm>
-        </p:spPr>
-        <p:txBody>
-          <a:bodyPr/>
-          <a:lstStyle/>
-          <a:p>
-            <a:pPr algn="ctr"/>
-            <a:r>
-              <a:rPr lang="es-AR" dirty="0" smtClean="0"/>
-              <a:t>Sprint 1 – Lecciones Aprendidas</a:t>
-            </a:r>
-            <a:endParaRPr lang="es-AR" dirty="0"/>
-          </a:p>
-        </p:txBody>
-      </p:sp>
-      <p:sp>
-        <p:nvSpPr>
-          <p:cNvPr id="3" name="2 Marcador de contenido"/>
-          <p:cNvSpPr>
-            <a:spLocks noGrp="1"/>
-          </p:cNvSpPr>
-          <p:nvPr>
-            <p:ph idx="1"/>
-          </p:nvPr>
-        </p:nvSpPr>
-        <p:spPr/>
-        <p:txBody>
-          <a:bodyPr/>
-          <a:lstStyle/>
-          <a:p>
-            <a:r>
-              <a:rPr lang="es-AR" dirty="0" smtClean="0"/>
-              <a:t>Complejidad en el uso de tecnologías muy recientes (</a:t>
-            </a:r>
-            <a:r>
-              <a:rPr lang="es-AR" dirty="0" err="1" smtClean="0"/>
-              <a:t>Android</a:t>
-            </a:r>
-            <a:r>
-              <a:rPr lang="es-AR" dirty="0" smtClean="0"/>
-              <a:t> Studio + </a:t>
-            </a:r>
-            <a:r>
-              <a:rPr lang="es-AR" dirty="0" err="1" smtClean="0"/>
-              <a:t>RoboLetric</a:t>
-            </a:r>
-            <a:r>
-              <a:rPr lang="es-AR" dirty="0" smtClean="0"/>
-              <a:t>)</a:t>
-            </a:r>
-          </a:p>
-          <a:p>
-            <a:r>
-              <a:rPr lang="es-AR" dirty="0" smtClean="0"/>
-              <a:t>Comienzo de tareas menos prioritarias</a:t>
-            </a:r>
-            <a:endParaRPr lang="es-AR" dirty="0"/>
-          </a:p>
-        </p:txBody>
-      </p:sp>
-    </p:spTree>
-  </p:cSld>
-  <p:clrMapOvr>
-    <a:masterClrMapping/>
-  </p:clrMapOvr>
-</p:sld>
-</file>
-
-<file path=ppt/slides/slide26.xml><?xml version="1.0" encoding="utf-8"?>
-<p:sld xmlns:a="http://schemas.openxmlformats.org/drawingml/2006/main" xmlns:r="http://schemas.openxmlformats.org/officeDocument/2006/relationships" xmlns:p="http://schemas.openxmlformats.org/presentationml/2006/main">
-  <p:cSld>
-    <p:spTree>
-      <p:nvGrpSpPr>
-        <p:cNvPr id="1" name=""/>
-        <p:cNvGrpSpPr/>
-        <p:nvPr/>
-      </p:nvGrpSpPr>
-      <p:grpSpPr>
-        <a:xfrm>
-          <a:off x="0" y="0"/>
-          <a:ext cx="0" cy="0"/>
-          <a:chOff x="0" y="0"/>
-          <a:chExt cx="0" cy="0"/>
-        </a:xfrm>
-      </p:grpSpPr>
-      <p:sp>
-        <p:nvSpPr>
-          <p:cNvPr id="2" name="1 Título"/>
-          <p:cNvSpPr>
-            <a:spLocks noGrp="1"/>
-          </p:cNvSpPr>
-          <p:nvPr>
-            <p:ph type="title"/>
-          </p:nvPr>
-        </p:nvSpPr>
-        <p:spPr>
-          <a:xfrm>
-            <a:off x="457200" y="285728"/>
-            <a:ext cx="8229600" cy="1143000"/>
-          </a:xfrm>
-        </p:spPr>
-        <p:txBody>
-          <a:bodyPr/>
-          <a:lstStyle/>
-          <a:p>
-            <a:pPr algn="ctr"/>
-            <a:r>
-              <a:rPr lang="es-AR" dirty="0" smtClean="0"/>
-              <a:t>Sprint 1 - Fin</a:t>
-            </a:r>
-            <a:endParaRPr lang="es-AR" dirty="0"/>
-          </a:p>
-        </p:txBody>
-      </p:sp>
-      <p:pic>
-        <p:nvPicPr>
-          <p:cNvPr id="4" name="3 Imagen" descr="images.jpg"/>
-          <p:cNvPicPr>
-            <a:picLocks noChangeAspect="1"/>
-          </p:cNvPicPr>
-          <p:nvPr/>
-        </p:nvPicPr>
-        <p:blipFill>
-          <a:blip r:embed="rId2"/>
-          <a:stretch>
-            <a:fillRect/>
-          </a:stretch>
-        </p:blipFill>
-        <p:spPr>
-          <a:xfrm>
-            <a:off x="922508" y="1928802"/>
-            <a:ext cx="7007078" cy="4024335"/>
-          </a:xfrm>
-          <a:prstGeom prst="rect">
-            <a:avLst/>
-          </a:prstGeom>
-        </p:spPr>
-      </p:pic>
     </p:spTree>
   </p:cSld>
   <p:clrMapOvr>
@@ -7891,7 +5029,7 @@
           <a:blip r:embed="rId2">
             <a:extLst>
               <a:ext uri="{28A0092B-C50C-407E-A947-70E740481C1C}">
-                <a14:useLocalDpi xmlns="" xmlns:wpc="http://schemas.microsoft.com/office/word/2010/wordprocessingCanvas" xmlns:mc="http://schemas.openxmlformats.org/markup-compatibility/2006" xmlns:o="urn:schemas-microsoft-com:office:office" xmlns:m="http://schemas.openxmlformats.org/officeDocument/2006/math" xmlns:v="urn:schemas-microsoft-com:vml" xmlns:wp14="http://schemas.microsoft.com/office/word/2010/wordprocessingDrawing" xmlns:wp="http://schemas.openxmlformats.org/drawingml/2006/wordprocessingDrawing" xmlns:w10="urn:schemas-microsoft-com:office:word" xmlns:w="http://schemas.openxmlformats.org/wordprocessingml/2006/main" xmlns:w14="http://schemas.microsoft.com/office/word/2010/wordml" xmlns:wpg="http://schemas.microsoft.com/office/word/2010/wordprocessingGroup" xmlns:wpi="http://schemas.microsoft.com/office/word/2010/wordprocessingInk" xmlns:wne="http://schemas.microsoft.com/office/word/2006/wordml" xmlns:wps="http://schemas.microsoft.com/office/word/2010/wordprocessingShape" xmlns:a14="http://schemas.microsoft.com/office/drawing/2010/main" xmlns:pic="http://schemas.openxmlformats.org/drawingml/2006/picture" xmlns:lc="http://schemas.openxmlformats.org/drawingml/2006/lockedCanvas" val="0"/>
+                <a14:useLocalDpi xmlns:lc="http://schemas.openxmlformats.org/drawingml/2006/lockedCanvas" xmlns:pic="http://schemas.openxmlformats.org/drawingml/2006/picture" xmlns:a14="http://schemas.microsoft.com/office/drawing/2010/main" xmlns:wps="http://schemas.microsoft.com/office/word/2010/wordprocessingShape" xmlns:wne="http://schemas.microsoft.com/office/word/2006/wordml" xmlns:wpi="http://schemas.microsoft.com/office/word/2010/wordprocessingInk" xmlns:wpg="http://schemas.microsoft.com/office/word/2010/wordprocessingGroup" xmlns:w14="http://schemas.microsoft.com/office/word/2010/wordml" xmlns:w="http://schemas.openxmlformats.org/wordprocessingml/2006/main" xmlns:w10="urn:schemas-microsoft-com:office:word" xmlns:wp="http://schemas.openxmlformats.org/drawingml/2006/wordprocessingDrawing" xmlns:wp14="http://schemas.microsoft.com/office/word/2010/wordprocessingDrawing" xmlns:v="urn:schemas-microsoft-com:vml" xmlns:m="http://schemas.openxmlformats.org/officeDocument/2006/math" xmlns:o="urn:schemas-microsoft-com:office:office" xmlns:mc="http://schemas.openxmlformats.org/markup-compatibility/2006" xmlns:wpc="http://schemas.microsoft.com/office/word/2010/wordprocessingCanvas" xmlns="" val="0"/>
               </a:ext>
             </a:extLst>
           </a:blip>

</xml_diff>